<commit_message>
in progress with test bench workspace
</commit_message>
<xml_diff>
--- a/DOC/isa_encoding.pptx
+++ b/DOC/isa_encoding.pptx
@@ -245,7 +245,7 @@
           <a:p>
             <a:fld id="{EE595349-DA93-472D-828A-76CE9E4C1479}" type="datetimeFigureOut">
               <a:rPr lang="ru-RU" smtClean="0"/>
-              <a:t>26.07.2014</a:t>
+              <a:t>15.08.2014</a:t>
             </a:fld>
             <a:endParaRPr lang="ru-RU"/>
           </a:p>
@@ -415,7 +415,7 @@
           <a:p>
             <a:fld id="{EE595349-DA93-472D-828A-76CE9E4C1479}" type="datetimeFigureOut">
               <a:rPr lang="ru-RU" smtClean="0"/>
-              <a:t>26.07.2014</a:t>
+              <a:t>15.08.2014</a:t>
             </a:fld>
             <a:endParaRPr lang="ru-RU"/>
           </a:p>
@@ -595,7 +595,7 @@
           <a:p>
             <a:fld id="{EE595349-DA93-472D-828A-76CE9E4C1479}" type="datetimeFigureOut">
               <a:rPr lang="ru-RU" smtClean="0"/>
-              <a:t>26.07.2014</a:t>
+              <a:t>15.08.2014</a:t>
             </a:fld>
             <a:endParaRPr lang="ru-RU"/>
           </a:p>
@@ -765,7 +765,7 @@
           <a:p>
             <a:fld id="{EE595349-DA93-472D-828A-76CE9E4C1479}" type="datetimeFigureOut">
               <a:rPr lang="ru-RU" smtClean="0"/>
-              <a:t>26.07.2014</a:t>
+              <a:t>15.08.2014</a:t>
             </a:fld>
             <a:endParaRPr lang="ru-RU"/>
           </a:p>
@@ -1011,7 +1011,7 @@
           <a:p>
             <a:fld id="{EE595349-DA93-472D-828A-76CE9E4C1479}" type="datetimeFigureOut">
               <a:rPr lang="ru-RU" smtClean="0"/>
-              <a:t>26.07.2014</a:t>
+              <a:t>15.08.2014</a:t>
             </a:fld>
             <a:endParaRPr lang="ru-RU"/>
           </a:p>
@@ -1243,7 +1243,7 @@
           <a:p>
             <a:fld id="{EE595349-DA93-472D-828A-76CE9E4C1479}" type="datetimeFigureOut">
               <a:rPr lang="ru-RU" smtClean="0"/>
-              <a:t>26.07.2014</a:t>
+              <a:t>15.08.2014</a:t>
             </a:fld>
             <a:endParaRPr lang="ru-RU"/>
           </a:p>
@@ -1610,7 +1610,7 @@
           <a:p>
             <a:fld id="{EE595349-DA93-472D-828A-76CE9E4C1479}" type="datetimeFigureOut">
               <a:rPr lang="ru-RU" smtClean="0"/>
-              <a:t>26.07.2014</a:t>
+              <a:t>15.08.2014</a:t>
             </a:fld>
             <a:endParaRPr lang="ru-RU"/>
           </a:p>
@@ -1728,7 +1728,7 @@
           <a:p>
             <a:fld id="{EE595349-DA93-472D-828A-76CE9E4C1479}" type="datetimeFigureOut">
               <a:rPr lang="ru-RU" smtClean="0"/>
-              <a:t>26.07.2014</a:t>
+              <a:t>15.08.2014</a:t>
             </a:fld>
             <a:endParaRPr lang="ru-RU"/>
           </a:p>
@@ -1823,7 +1823,7 @@
           <a:p>
             <a:fld id="{EE595349-DA93-472D-828A-76CE9E4C1479}" type="datetimeFigureOut">
               <a:rPr lang="ru-RU" smtClean="0"/>
-              <a:t>26.07.2014</a:t>
+              <a:t>15.08.2014</a:t>
             </a:fld>
             <a:endParaRPr lang="ru-RU"/>
           </a:p>
@@ -2100,7 +2100,7 @@
           <a:p>
             <a:fld id="{EE595349-DA93-472D-828A-76CE9E4C1479}" type="datetimeFigureOut">
               <a:rPr lang="ru-RU" smtClean="0"/>
-              <a:t>26.07.2014</a:t>
+              <a:t>15.08.2014</a:t>
             </a:fld>
             <a:endParaRPr lang="ru-RU"/>
           </a:p>
@@ -2353,7 +2353,7 @@
           <a:p>
             <a:fld id="{EE595349-DA93-472D-828A-76CE9E4C1479}" type="datetimeFigureOut">
               <a:rPr lang="ru-RU" smtClean="0"/>
-              <a:t>26.07.2014</a:t>
+              <a:t>15.08.2014</a:t>
             </a:fld>
             <a:endParaRPr lang="ru-RU"/>
           </a:p>
@@ -2566,7 +2566,7 @@
           <a:p>
             <a:fld id="{EE595349-DA93-472D-828A-76CE9E4C1479}" type="datetimeFigureOut">
               <a:rPr lang="ru-RU" smtClean="0"/>
-              <a:t>26.07.2014</a:t>
+              <a:t>15.08.2014</a:t>
             </a:fld>
             <a:endParaRPr lang="ru-RU"/>
           </a:p>
@@ -4335,11 +4335,7 @@
           <a:p>
             <a:r>
               <a:rPr lang="en-US" dirty="0" smtClean="0"/>
-              <a:t>R0                 R1                 R2                             not used               </a:t>
-            </a:r>
-            <a:r>
-              <a:rPr lang="en-US" dirty="0" smtClean="0"/>
-              <a:t>     </a:t>
+              <a:t>R0                 R1                 R2                             not used                    </a:t>
             </a:r>
             <a:r>
               <a:rPr lang="en-US" dirty="0" err="1" smtClean="0"/>
@@ -4347,11 +4343,7 @@
             </a:r>
             <a:r>
               <a:rPr lang="en-US" dirty="0" smtClean="0"/>
-              <a:t> </a:t>
-            </a:r>
-            <a:r>
-              <a:rPr lang="en-US" dirty="0" smtClean="0"/>
-              <a:t>flags</a:t>
+              <a:t> flags</a:t>
             </a:r>
             <a:endParaRPr lang="ru-RU" dirty="0"/>
           </a:p>
@@ -4675,6 +4667,95 @@
               <a:t>1</a:t>
             </a:r>
             <a:endParaRPr lang="ru-RU" dirty="0"/>
+          </a:p>
+        </p:txBody>
+      </p:sp>
+      <p:sp>
+        <p:nvSpPr>
+          <p:cNvPr id="50" name="TextBox 49"/>
+          <p:cNvSpPr txBox="1"/>
+          <p:nvPr/>
+        </p:nvSpPr>
+        <p:spPr>
+          <a:xfrm>
+            <a:off x="535707" y="5580185"/>
+            <a:ext cx="8819308" cy="1200329"/>
+          </a:xfrm>
+          <a:prstGeom prst="rect">
+            <a:avLst/>
+          </a:prstGeom>
+          <a:noFill/>
+        </p:spPr>
+        <p:txBody>
+          <a:bodyPr wrap="square" rtlCol="0">
+            <a:spAutoFit/>
+          </a:bodyPr>
+          <a:lstStyle/>
+          <a:p>
+            <a:r>
+              <a:rPr lang="pt-BR" dirty="0">
+                <a:latin typeface="Courier New" panose="02070309020205020404" pitchFamily="49" charset="0"/>
+                <a:cs typeface="Courier New" panose="02070309020205020404" pitchFamily="49" charset="0"/>
+              </a:rPr>
+              <a:t>i, 1, a, or,  R2, R0, </a:t>
+            </a:r>
+            <a:r>
+              <a:rPr lang="pt-BR" dirty="0" smtClean="0">
+                <a:latin typeface="Courier New" panose="02070309020205020404" pitchFamily="49" charset="0"/>
+                <a:cs typeface="Courier New" panose="02070309020205020404" pitchFamily="49" charset="0"/>
+              </a:rPr>
+              <a:t>R0  // r2 := (r0 | 2) </a:t>
+            </a:r>
+            <a:endParaRPr lang="pt-BR" dirty="0">
+              <a:latin typeface="Courier New" panose="02070309020205020404" pitchFamily="49" charset="0"/>
+              <a:cs typeface="Courier New" panose="02070309020205020404" pitchFamily="49" charset="0"/>
+            </a:endParaRPr>
+          </a:p>
+          <a:p>
+            <a:r>
+              <a:rPr lang="pt-BR" dirty="0">
+                <a:latin typeface="Courier New" panose="02070309020205020404" pitchFamily="49" charset="0"/>
+                <a:cs typeface="Courier New" panose="02070309020205020404" pitchFamily="49" charset="0"/>
+              </a:rPr>
+              <a:t>di, </a:t>
+            </a:r>
+            <a:r>
+              <a:rPr lang="pt-BR" dirty="0" smtClean="0">
+                <a:latin typeface="Courier New" panose="02070309020205020404" pitchFamily="49" charset="0"/>
+                <a:cs typeface="Courier New" panose="02070309020205020404" pitchFamily="49" charset="0"/>
+              </a:rPr>
+              <a:t>2                     // data        2</a:t>
+            </a:r>
+            <a:endParaRPr lang="pt-BR" dirty="0">
+              <a:latin typeface="Courier New" panose="02070309020205020404" pitchFamily="49" charset="0"/>
+              <a:cs typeface="Courier New" panose="02070309020205020404" pitchFamily="49" charset="0"/>
+            </a:endParaRPr>
+          </a:p>
+          <a:p>
+            <a:r>
+              <a:rPr lang="pt-BR" dirty="0">
+                <a:latin typeface="Courier New" panose="02070309020205020404" pitchFamily="49" charset="0"/>
+                <a:cs typeface="Courier New" panose="02070309020205020404" pitchFamily="49" charset="0"/>
+              </a:rPr>
+              <a:t>r, 1, a, add, R0, R1, </a:t>
+            </a:r>
+            <a:r>
+              <a:rPr lang="pt-BR" dirty="0" smtClean="0">
+                <a:latin typeface="Courier New" panose="02070309020205020404" pitchFamily="49" charset="0"/>
+                <a:cs typeface="Courier New" panose="02070309020205020404" pitchFamily="49" charset="0"/>
+              </a:rPr>
+              <a:t>R2  // r0 := r1 + r2</a:t>
+            </a:r>
+            <a:endParaRPr lang="pt-BR" dirty="0">
+              <a:latin typeface="Courier New" panose="02070309020205020404" pitchFamily="49" charset="0"/>
+              <a:cs typeface="Courier New" panose="02070309020205020404" pitchFamily="49" charset="0"/>
+            </a:endParaRPr>
+          </a:p>
+          <a:p>
+            <a:endParaRPr lang="ru-RU" dirty="0">
+              <a:latin typeface="Courier New" panose="02070309020205020404" pitchFamily="49" charset="0"/>
+              <a:cs typeface="Courier New" panose="02070309020205020404" pitchFamily="49" charset="0"/>
+            </a:endParaRPr>
           </a:p>
         </p:txBody>
       </p:sp>
@@ -6007,6 +6088,83 @@
               <a:t> flags</a:t>
             </a:r>
             <a:endParaRPr lang="ru-RU" dirty="0"/>
+          </a:p>
+        </p:txBody>
+      </p:sp>
+      <p:sp>
+        <p:nvSpPr>
+          <p:cNvPr id="3" name="TextBox 2"/>
+          <p:cNvSpPr txBox="1"/>
+          <p:nvPr/>
+        </p:nvSpPr>
+        <p:spPr>
+          <a:xfrm>
+            <a:off x="535707" y="5580185"/>
+            <a:ext cx="8819308" cy="646331"/>
+          </a:xfrm>
+          <a:prstGeom prst="rect">
+            <a:avLst/>
+          </a:prstGeom>
+          <a:noFill/>
+        </p:spPr>
+        <p:txBody>
+          <a:bodyPr wrap="square" rtlCol="0">
+            <a:spAutoFit/>
+          </a:bodyPr>
+          <a:lstStyle/>
+          <a:p>
+            <a:r>
+              <a:rPr lang="pt-BR" dirty="0">
+                <a:latin typeface="Courier New" panose="02070309020205020404" pitchFamily="49" charset="0"/>
+                <a:cs typeface="Courier New" panose="02070309020205020404" pitchFamily="49" charset="0"/>
+              </a:rPr>
+              <a:t>r, 0, m, sw,  R0, R3, R2, 255 </a:t>
+            </a:r>
+            <a:r>
+              <a:rPr lang="pt-BR" dirty="0" smtClean="0">
+                <a:latin typeface="Courier New" panose="02070309020205020404" pitchFamily="49" charset="0"/>
+                <a:cs typeface="Courier New" panose="02070309020205020404" pitchFamily="49" charset="0"/>
+              </a:rPr>
+              <a:t>// mem(r2+255) := r3 </a:t>
+            </a:r>
+            <a:endParaRPr lang="pt-BR" dirty="0">
+              <a:latin typeface="Courier New" panose="02070309020205020404" pitchFamily="49" charset="0"/>
+              <a:cs typeface="Courier New" panose="02070309020205020404" pitchFamily="49" charset="0"/>
+            </a:endParaRPr>
+          </a:p>
+          <a:p>
+            <a:r>
+              <a:rPr lang="pt-BR" dirty="0">
+                <a:latin typeface="Courier New" panose="02070309020205020404" pitchFamily="49" charset="0"/>
+                <a:cs typeface="Courier New" panose="02070309020205020404" pitchFamily="49" charset="0"/>
+              </a:rPr>
+              <a:t>r, 1, m, lw,  </a:t>
+            </a:r>
+            <a:r>
+              <a:rPr lang="pt-BR" dirty="0" smtClean="0">
+                <a:latin typeface="Courier New" panose="02070309020205020404" pitchFamily="49" charset="0"/>
+                <a:cs typeface="Courier New" panose="02070309020205020404" pitchFamily="49" charset="0"/>
+              </a:rPr>
+              <a:t>R0</a:t>
+            </a:r>
+            <a:r>
+              <a:rPr lang="pt-BR" dirty="0">
+                <a:latin typeface="Courier New" panose="02070309020205020404" pitchFamily="49" charset="0"/>
+                <a:cs typeface="Courier New" panose="02070309020205020404" pitchFamily="49" charset="0"/>
+              </a:rPr>
+              <a:t>, R0, R2, 255 </a:t>
+            </a:r>
+            <a:r>
+              <a:rPr lang="pt-BR" dirty="0" smtClean="0">
+                <a:latin typeface="Courier New" panose="02070309020205020404" pitchFamily="49" charset="0"/>
+                <a:cs typeface="Courier New" panose="02070309020205020404" pitchFamily="49" charset="0"/>
+              </a:rPr>
+              <a:t>// r0 := mem(r2+255)</a:t>
+            </a:r>
+            <a:endParaRPr lang="ru-RU" dirty="0">
+              <a:latin typeface="Courier New" panose="02070309020205020404" pitchFamily="49" charset="0"/>
+              <a:cs typeface="Courier New" panose="02070309020205020404" pitchFamily="49" charset="0"/>
+            </a:endParaRPr>
           </a:p>
         </p:txBody>
       </p:sp>

</xml_diff>

<commit_message>
jump and + 2 cond tests
</commit_message>
<xml_diff>
--- a/DOC/isa_encoding.pptx
+++ b/DOC/isa_encoding.pptx
@@ -245,7 +245,7 @@
           <a:p>
             <a:fld id="{EE595349-DA93-472D-828A-76CE9E4C1479}" type="datetimeFigureOut">
               <a:rPr lang="ru-RU" smtClean="0"/>
-              <a:t>17.09.2014</a:t>
+              <a:t>03.03.2015</a:t>
             </a:fld>
             <a:endParaRPr lang="ru-RU"/>
           </a:p>
@@ -415,7 +415,7 @@
           <a:p>
             <a:fld id="{EE595349-DA93-472D-828A-76CE9E4C1479}" type="datetimeFigureOut">
               <a:rPr lang="ru-RU" smtClean="0"/>
-              <a:t>17.09.2014</a:t>
+              <a:t>03.03.2015</a:t>
             </a:fld>
             <a:endParaRPr lang="ru-RU"/>
           </a:p>
@@ -595,7 +595,7 @@
           <a:p>
             <a:fld id="{EE595349-DA93-472D-828A-76CE9E4C1479}" type="datetimeFigureOut">
               <a:rPr lang="ru-RU" smtClean="0"/>
-              <a:t>17.09.2014</a:t>
+              <a:t>03.03.2015</a:t>
             </a:fld>
             <a:endParaRPr lang="ru-RU"/>
           </a:p>
@@ -765,7 +765,7 @@
           <a:p>
             <a:fld id="{EE595349-DA93-472D-828A-76CE9E4C1479}" type="datetimeFigureOut">
               <a:rPr lang="ru-RU" smtClean="0"/>
-              <a:t>17.09.2014</a:t>
+              <a:t>03.03.2015</a:t>
             </a:fld>
             <a:endParaRPr lang="ru-RU"/>
           </a:p>
@@ -1011,7 +1011,7 @@
           <a:p>
             <a:fld id="{EE595349-DA93-472D-828A-76CE9E4C1479}" type="datetimeFigureOut">
               <a:rPr lang="ru-RU" smtClean="0"/>
-              <a:t>17.09.2014</a:t>
+              <a:t>03.03.2015</a:t>
             </a:fld>
             <a:endParaRPr lang="ru-RU"/>
           </a:p>
@@ -1243,7 +1243,7 @@
           <a:p>
             <a:fld id="{EE595349-DA93-472D-828A-76CE9E4C1479}" type="datetimeFigureOut">
               <a:rPr lang="ru-RU" smtClean="0"/>
-              <a:t>17.09.2014</a:t>
+              <a:t>03.03.2015</a:t>
             </a:fld>
             <a:endParaRPr lang="ru-RU"/>
           </a:p>
@@ -1610,7 +1610,7 @@
           <a:p>
             <a:fld id="{EE595349-DA93-472D-828A-76CE9E4C1479}" type="datetimeFigureOut">
               <a:rPr lang="ru-RU" smtClean="0"/>
-              <a:t>17.09.2014</a:t>
+              <a:t>03.03.2015</a:t>
             </a:fld>
             <a:endParaRPr lang="ru-RU"/>
           </a:p>
@@ -1728,7 +1728,7 @@
           <a:p>
             <a:fld id="{EE595349-DA93-472D-828A-76CE9E4C1479}" type="datetimeFigureOut">
               <a:rPr lang="ru-RU" smtClean="0"/>
-              <a:t>17.09.2014</a:t>
+              <a:t>03.03.2015</a:t>
             </a:fld>
             <a:endParaRPr lang="ru-RU"/>
           </a:p>
@@ -1823,7 +1823,7 @@
           <a:p>
             <a:fld id="{EE595349-DA93-472D-828A-76CE9E4C1479}" type="datetimeFigureOut">
               <a:rPr lang="ru-RU" smtClean="0"/>
-              <a:t>17.09.2014</a:t>
+              <a:t>03.03.2015</a:t>
             </a:fld>
             <a:endParaRPr lang="ru-RU"/>
           </a:p>
@@ -2100,7 +2100,7 @@
           <a:p>
             <a:fld id="{EE595349-DA93-472D-828A-76CE9E4C1479}" type="datetimeFigureOut">
               <a:rPr lang="ru-RU" smtClean="0"/>
-              <a:t>17.09.2014</a:t>
+              <a:t>03.03.2015</a:t>
             </a:fld>
             <a:endParaRPr lang="ru-RU"/>
           </a:p>
@@ -2353,7 +2353,7 @@
           <a:p>
             <a:fld id="{EE595349-DA93-472D-828A-76CE9E4C1479}" type="datetimeFigureOut">
               <a:rPr lang="ru-RU" smtClean="0"/>
-              <a:t>17.09.2014</a:t>
+              <a:t>03.03.2015</a:t>
             </a:fld>
             <a:endParaRPr lang="ru-RU"/>
           </a:p>
@@ -2566,7 +2566,7 @@
           <a:p>
             <a:fld id="{EE595349-DA93-472D-828A-76CE9E4C1479}" type="datetimeFigureOut">
               <a:rPr lang="ru-RU" smtClean="0"/>
-              <a:t>17.09.2014</a:t>
+              <a:t>03.03.2015</a:t>
             </a:fld>
             <a:endParaRPr lang="ru-RU"/>
           </a:p>
@@ -6159,35 +6159,24 @@
                 <a:latin typeface="Courier New" panose="02070309020205020404" pitchFamily="49" charset="0"/>
                 <a:cs typeface="Courier New" panose="02070309020205020404" pitchFamily="49" charset="0"/>
               </a:rPr>
-              <a:t>// r0 := mem(r2+255</a:t>
+              <a:t>// r0 := mem(r2+255)</a:t>
+            </a:r>
+          </a:p>
+          <a:p>
+            <a:r>
+              <a:rPr lang="pt-BR" dirty="0">
+                <a:latin typeface="Courier New" panose="02070309020205020404" pitchFamily="49" charset="0"/>
+                <a:cs typeface="Courier New" panose="02070309020205020404" pitchFamily="49" charset="0"/>
+              </a:rPr>
+              <a:t> </a:t>
             </a:r>
             <a:r>
               <a:rPr lang="pt-BR" dirty="0" smtClean="0">
                 <a:latin typeface="Courier New" panose="02070309020205020404" pitchFamily="49" charset="0"/>
                 <a:cs typeface="Courier New" panose="02070309020205020404" pitchFamily="49" charset="0"/>
               </a:rPr>
-              <a:t>)</a:t>
-            </a:r>
-          </a:p>
-          <a:p>
-            <a:r>
-              <a:rPr lang="pt-BR" dirty="0">
-                <a:latin typeface="Courier New" panose="02070309020205020404" pitchFamily="49" charset="0"/>
-                <a:cs typeface="Courier New" panose="02070309020205020404" pitchFamily="49" charset="0"/>
-              </a:rPr>
-              <a:t> </a:t>
-            </a:r>
-            <a:r>
-              <a:rPr lang="pt-BR" dirty="0" smtClean="0">
-                <a:latin typeface="Courier New" panose="02070309020205020404" pitchFamily="49" charset="0"/>
-                <a:cs typeface="Courier New" panose="02070309020205020404" pitchFamily="49" charset="0"/>
-              </a:rPr>
               <a:t>                             //</a:t>
             </a:r>
-            <a:endParaRPr lang="pt-BR" dirty="0" smtClean="0">
-              <a:latin typeface="Courier New" panose="02070309020205020404" pitchFamily="49" charset="0"/>
-              <a:cs typeface="Courier New" panose="02070309020205020404" pitchFamily="49" charset="0"/>
-            </a:endParaRPr>
           </a:p>
           <a:p>
             <a:r>

</xml_diff>

<commit_message>
edit doc, no more we flag inside the instruction;
</commit_message>
<xml_diff>
--- a/DOC/isa_encoding.pptx
+++ b/DOC/isa_encoding.pptx
@@ -245,7 +245,7 @@
           <a:p>
             <a:fld id="{EE595349-DA93-472D-828A-76CE9E4C1479}" type="datetimeFigureOut">
               <a:rPr lang="ru-RU" smtClean="0"/>
-              <a:t>03.03.2015</a:t>
+              <a:t>04.02.2018</a:t>
             </a:fld>
             <a:endParaRPr lang="ru-RU"/>
           </a:p>
@@ -415,7 +415,7 @@
           <a:p>
             <a:fld id="{EE595349-DA93-472D-828A-76CE9E4C1479}" type="datetimeFigureOut">
               <a:rPr lang="ru-RU" smtClean="0"/>
-              <a:t>03.03.2015</a:t>
+              <a:t>04.02.2018</a:t>
             </a:fld>
             <a:endParaRPr lang="ru-RU"/>
           </a:p>
@@ -595,7 +595,7 @@
           <a:p>
             <a:fld id="{EE595349-DA93-472D-828A-76CE9E4C1479}" type="datetimeFigureOut">
               <a:rPr lang="ru-RU" smtClean="0"/>
-              <a:t>03.03.2015</a:t>
+              <a:t>04.02.2018</a:t>
             </a:fld>
             <a:endParaRPr lang="ru-RU"/>
           </a:p>
@@ -765,7 +765,7 @@
           <a:p>
             <a:fld id="{EE595349-DA93-472D-828A-76CE9E4C1479}" type="datetimeFigureOut">
               <a:rPr lang="ru-RU" smtClean="0"/>
-              <a:t>03.03.2015</a:t>
+              <a:t>04.02.2018</a:t>
             </a:fld>
             <a:endParaRPr lang="ru-RU"/>
           </a:p>
@@ -1011,7 +1011,7 @@
           <a:p>
             <a:fld id="{EE595349-DA93-472D-828A-76CE9E4C1479}" type="datetimeFigureOut">
               <a:rPr lang="ru-RU" smtClean="0"/>
-              <a:t>03.03.2015</a:t>
+              <a:t>04.02.2018</a:t>
             </a:fld>
             <a:endParaRPr lang="ru-RU"/>
           </a:p>
@@ -1243,7 +1243,7 @@
           <a:p>
             <a:fld id="{EE595349-DA93-472D-828A-76CE9E4C1479}" type="datetimeFigureOut">
               <a:rPr lang="ru-RU" smtClean="0"/>
-              <a:t>03.03.2015</a:t>
+              <a:t>04.02.2018</a:t>
             </a:fld>
             <a:endParaRPr lang="ru-RU"/>
           </a:p>
@@ -1610,7 +1610,7 @@
           <a:p>
             <a:fld id="{EE595349-DA93-472D-828A-76CE9E4C1479}" type="datetimeFigureOut">
               <a:rPr lang="ru-RU" smtClean="0"/>
-              <a:t>03.03.2015</a:t>
+              <a:t>04.02.2018</a:t>
             </a:fld>
             <a:endParaRPr lang="ru-RU"/>
           </a:p>
@@ -1728,7 +1728,7 @@
           <a:p>
             <a:fld id="{EE595349-DA93-472D-828A-76CE9E4C1479}" type="datetimeFigureOut">
               <a:rPr lang="ru-RU" smtClean="0"/>
-              <a:t>03.03.2015</a:t>
+              <a:t>04.02.2018</a:t>
             </a:fld>
             <a:endParaRPr lang="ru-RU"/>
           </a:p>
@@ -1823,7 +1823,7 @@
           <a:p>
             <a:fld id="{EE595349-DA93-472D-828A-76CE9E4C1479}" type="datetimeFigureOut">
               <a:rPr lang="ru-RU" smtClean="0"/>
-              <a:t>03.03.2015</a:t>
+              <a:t>04.02.2018</a:t>
             </a:fld>
             <a:endParaRPr lang="ru-RU"/>
           </a:p>
@@ -2100,7 +2100,7 @@
           <a:p>
             <a:fld id="{EE595349-DA93-472D-828A-76CE9E4C1479}" type="datetimeFigureOut">
               <a:rPr lang="ru-RU" smtClean="0"/>
-              <a:t>03.03.2015</a:t>
+              <a:t>04.02.2018</a:t>
             </a:fld>
             <a:endParaRPr lang="ru-RU"/>
           </a:p>
@@ -2353,7 +2353,7 @@
           <a:p>
             <a:fld id="{EE595349-DA93-472D-828A-76CE9E4C1479}" type="datetimeFigureOut">
               <a:rPr lang="ru-RU" smtClean="0"/>
-              <a:t>03.03.2015</a:t>
+              <a:t>04.02.2018</a:t>
             </a:fld>
             <a:endParaRPr lang="ru-RU"/>
           </a:p>
@@ -2566,7 +2566,7 @@
           <a:p>
             <a:fld id="{EE595349-DA93-472D-828A-76CE9E4C1479}" type="datetimeFigureOut">
               <a:rPr lang="ru-RU" smtClean="0"/>
-              <a:t>03.03.2015</a:t>
+              <a:t>04.02.2018</a:t>
             </a:fld>
             <a:endParaRPr lang="ru-RU"/>
           </a:p>
@@ -3185,14 +3185,14 @@
       </p:sp>
       <p:sp>
         <p:nvSpPr>
-          <p:cNvPr id="7" name="Rectangle 6"/>
+          <p:cNvPr id="10" name="Rectangle 9"/>
           <p:cNvSpPr/>
           <p:nvPr/>
         </p:nvSpPr>
         <p:spPr>
           <a:xfrm>
-            <a:off x="905163" y="2287777"/>
-            <a:ext cx="415636" cy="455424"/>
+            <a:off x="902854" y="2287776"/>
+            <a:ext cx="1249217" cy="455424"/>
           </a:xfrm>
           <a:prstGeom prst="rect">
             <a:avLst/>
@@ -3226,12 +3226,20 @@
           <a:p>
             <a:pPr algn="ctr"/>
             <a:r>
+              <a:rPr lang="en-US" dirty="0" smtClean="0">
+                <a:solidFill>
+                  <a:schemeClr val="tx1"/>
+                </a:solidFill>
+              </a:rPr>
+              <a:t>30 -- </a:t>
+            </a:r>
+            <a:r>
               <a:rPr lang="ru-RU" dirty="0" smtClean="0">
                 <a:solidFill>
                   <a:schemeClr val="tx1"/>
                 </a:solidFill>
               </a:rPr>
-              <a:t>30</a:t>
+              <a:t>28</a:t>
             </a:r>
             <a:endParaRPr lang="ru-RU" dirty="0">
               <a:solidFill>
@@ -3241,16 +3249,110 @@
           </a:p>
         </p:txBody>
       </p:sp>
-      <p:sp>
-        <p:nvSpPr>
-          <p:cNvPr id="10" name="Rectangle 9"/>
+      <p:cxnSp>
+        <p:nvCxnSpPr>
+          <p:cNvPr id="13" name="Straight Arrow Connector 12"/>
+          <p:cNvCxnSpPr>
+            <a:stCxn id="6" idx="2"/>
+          </p:cNvCxnSpPr>
+          <p:nvPr/>
+        </p:nvCxnSpPr>
+        <p:spPr>
+          <a:xfrm flipH="1">
+            <a:off x="695036" y="2743200"/>
+            <a:ext cx="2309" cy="711200"/>
+          </a:xfrm>
+          <a:prstGeom prst="straightConnector1">
+            <a:avLst/>
+          </a:prstGeom>
+          <a:ln>
+            <a:tailEnd type="triangle"/>
+          </a:ln>
+        </p:spPr>
+        <p:style>
+          <a:lnRef idx="1">
+            <a:schemeClr val="accent1"/>
+          </a:lnRef>
+          <a:fillRef idx="0">
+            <a:schemeClr val="accent1"/>
+          </a:fillRef>
+          <a:effectRef idx="0">
+            <a:schemeClr val="accent1"/>
+          </a:effectRef>
+          <a:fontRef idx="minor">
+            <a:schemeClr val="tx1"/>
+          </a:fontRef>
+        </p:style>
+      </p:cxnSp>
+      <p:sp>
+        <p:nvSpPr>
+          <p:cNvPr id="15" name="TextBox 14"/>
+          <p:cNvSpPr txBox="1"/>
+          <p:nvPr/>
+        </p:nvSpPr>
+        <p:spPr>
+          <a:xfrm>
+            <a:off x="535707" y="3454400"/>
+            <a:ext cx="7666184" cy="646331"/>
+          </a:xfrm>
+          <a:prstGeom prst="rect">
+            <a:avLst/>
+          </a:prstGeom>
+          <a:noFill/>
+        </p:spPr>
+        <p:txBody>
+          <a:bodyPr wrap="square" rtlCol="0">
+            <a:spAutoFit/>
+          </a:bodyPr>
+          <a:lstStyle/>
+          <a:p>
+            <a:r>
+              <a:rPr lang="en-US" dirty="0" smtClean="0">
+                <a:latin typeface="Times New Roman" panose="02020603050405020304" pitchFamily="18" charset="0"/>
+                <a:cs typeface="Times New Roman" panose="02020603050405020304" pitchFamily="18" charset="0"/>
+              </a:rPr>
+              <a:t>I</a:t>
+            </a:r>
+            <a:r>
+              <a:rPr lang="en-US" dirty="0">
+                <a:latin typeface="Times New Roman" panose="02020603050405020304" pitchFamily="18" charset="0"/>
+                <a:cs typeface="Times New Roman" panose="02020603050405020304" pitchFamily="18" charset="0"/>
+              </a:rPr>
+              <a:t> </a:t>
+            </a:r>
+            <a:r>
+              <a:rPr lang="en-US" dirty="0" smtClean="0">
+                <a:latin typeface="Times New Roman" panose="02020603050405020304" pitchFamily="18" charset="0"/>
+                <a:cs typeface="Times New Roman" panose="02020603050405020304" pitchFamily="18" charset="0"/>
+              </a:rPr>
+              <a:t>– flag (if set, this command is immediate, next one is 32 bit data );</a:t>
+            </a:r>
+          </a:p>
+          <a:p>
+            <a:r>
+              <a:rPr lang="en-US" dirty="0" smtClean="0">
+                <a:latin typeface="Times New Roman" panose="02020603050405020304" pitchFamily="18" charset="0"/>
+                <a:cs typeface="Times New Roman" panose="02020603050405020304" pitchFamily="18" charset="0"/>
+              </a:rPr>
+              <a:t>Immediate commands don’t use R2 field;</a:t>
+            </a:r>
+            <a:endParaRPr lang="ru-RU" dirty="0">
+              <a:latin typeface="Times New Roman" panose="02020603050405020304" pitchFamily="18" charset="0"/>
+              <a:cs typeface="Times New Roman" panose="02020603050405020304" pitchFamily="18" charset="0"/>
+            </a:endParaRPr>
+          </a:p>
+        </p:txBody>
+      </p:sp>
+      <p:sp>
+        <p:nvSpPr>
+          <p:cNvPr id="20" name="Rectangle 19"/>
           <p:cNvSpPr/>
           <p:nvPr/>
         </p:nvSpPr>
         <p:spPr>
           <a:xfrm>
-            <a:off x="1320799" y="2287776"/>
-            <a:ext cx="831272" cy="455424"/>
+            <a:off x="2152071" y="2286555"/>
+            <a:ext cx="1290780" cy="455424"/>
           </a:xfrm>
           <a:prstGeom prst="rect">
             <a:avLst/>
@@ -3289,7 +3391,31 @@
                   <a:schemeClr val="tx1"/>
                 </a:solidFill>
               </a:rPr>
-              <a:t>29-28</a:t>
+              <a:t>2</a:t>
+            </a:r>
+            <a:r>
+              <a:rPr lang="en-US" dirty="0" smtClean="0">
+                <a:solidFill>
+                  <a:schemeClr val="tx1"/>
+                </a:solidFill>
+              </a:rPr>
+              <a:t>7 -- </a:t>
+            </a:r>
+            <a:r>
+              <a:rPr lang="ru-RU" dirty="0" smtClean="0">
+                <a:solidFill>
+                  <a:schemeClr val="tx1"/>
+                </a:solidFill>
+              </a:rPr>
+              <a:t>2</a:t>
+            </a:r>
+            <a:r>
+              <a:rPr lang="en-US" dirty="0" smtClean="0">
+                <a:solidFill>
+                  <a:schemeClr val="tx1"/>
+                </a:solidFill>
+              </a:rPr>
+              <a:t>4</a:t>
             </a:r>
             <a:endParaRPr lang="ru-RU" dirty="0">
               <a:solidFill>
@@ -3299,51 +3425,16 @@
           </a:p>
         </p:txBody>
       </p:sp>
-      <p:cxnSp>
-        <p:nvCxnSpPr>
-          <p:cNvPr id="13" name="Straight Arrow Connector 12"/>
-          <p:cNvCxnSpPr>
-            <a:stCxn id="6" idx="2"/>
-          </p:cNvCxnSpPr>
-          <p:nvPr/>
-        </p:nvCxnSpPr>
-        <p:spPr>
-          <a:xfrm flipH="1">
-            <a:off x="695036" y="2743200"/>
-            <a:ext cx="2309" cy="711200"/>
-          </a:xfrm>
-          <a:prstGeom prst="straightConnector1">
-            <a:avLst/>
-          </a:prstGeom>
-          <a:ln>
-            <a:tailEnd type="triangle"/>
-          </a:ln>
-        </p:spPr>
-        <p:style>
-          <a:lnRef idx="1">
-            <a:schemeClr val="accent1"/>
-          </a:lnRef>
-          <a:fillRef idx="0">
-            <a:schemeClr val="accent1"/>
-          </a:fillRef>
-          <a:effectRef idx="0">
-            <a:schemeClr val="accent1"/>
-          </a:effectRef>
-          <a:fontRef idx="minor">
-            <a:schemeClr val="tx1"/>
-          </a:fontRef>
-        </p:style>
-      </p:cxnSp>
-      <p:sp>
-        <p:nvSpPr>
-          <p:cNvPr id="15" name="TextBox 14"/>
+      <p:sp>
+        <p:nvSpPr>
+          <p:cNvPr id="23" name="TextBox 22"/>
           <p:cNvSpPr txBox="1"/>
           <p:nvPr/>
         </p:nvSpPr>
         <p:spPr>
           <a:xfrm>
-            <a:off x="535707" y="3454400"/>
-            <a:ext cx="7666184" cy="369332"/>
+            <a:off x="535707" y="1833602"/>
+            <a:ext cx="272472" cy="369332"/>
           </a:xfrm>
           <a:prstGeom prst="rect">
             <a:avLst/>
@@ -3357,43 +3448,23 @@
           <a:lstStyle/>
           <a:p>
             <a:r>
-              <a:rPr lang="en-US" dirty="0" smtClean="0">
-                <a:latin typeface="Times New Roman" panose="02020603050405020304" pitchFamily="18" charset="0"/>
-                <a:cs typeface="Times New Roman" panose="02020603050405020304" pitchFamily="18" charset="0"/>
-              </a:rPr>
-              <a:t>I</a:t>
-            </a:r>
-            <a:r>
-              <a:rPr lang="en-US" dirty="0">
-                <a:latin typeface="Times New Roman" panose="02020603050405020304" pitchFamily="18" charset="0"/>
-                <a:cs typeface="Times New Roman" panose="02020603050405020304" pitchFamily="18" charset="0"/>
-              </a:rPr>
-              <a:t> </a:t>
-            </a:r>
-            <a:r>
-              <a:rPr lang="en-US" dirty="0" smtClean="0">
-                <a:latin typeface="Times New Roman" panose="02020603050405020304" pitchFamily="18" charset="0"/>
-                <a:cs typeface="Times New Roman" panose="02020603050405020304" pitchFamily="18" charset="0"/>
-              </a:rPr>
-              <a:t>– flag (if set, this command is immediate, next one is 32 bit data )</a:t>
-            </a:r>
-            <a:endParaRPr lang="ru-RU" dirty="0">
-              <a:latin typeface="Times New Roman" panose="02020603050405020304" pitchFamily="18" charset="0"/>
-              <a:cs typeface="Times New Roman" panose="02020603050405020304" pitchFamily="18" charset="0"/>
-            </a:endParaRPr>
-          </a:p>
-        </p:txBody>
-      </p:sp>
-      <p:sp>
-        <p:nvSpPr>
-          <p:cNvPr id="17" name="TextBox 16"/>
+              <a:rPr lang="en-US" dirty="0"/>
+              <a:t>1</a:t>
+            </a:r>
+            <a:endParaRPr lang="ru-RU" dirty="0"/>
+          </a:p>
+        </p:txBody>
+      </p:sp>
+      <p:sp>
+        <p:nvSpPr>
+          <p:cNvPr id="25" name="TextBox 24"/>
           <p:cNvSpPr txBox="1"/>
           <p:nvPr/>
         </p:nvSpPr>
         <p:spPr>
           <a:xfrm>
-            <a:off x="808180" y="3976254"/>
-            <a:ext cx="1974097" cy="369332"/>
+            <a:off x="1364826" y="1833602"/>
+            <a:ext cx="272472" cy="369332"/>
           </a:xfrm>
           <a:prstGeom prst="rect">
             <a:avLst/>
@@ -3407,149 +3478,28 @@
           <a:lstStyle/>
           <a:p>
             <a:r>
-              <a:rPr lang="en-US" dirty="0" smtClean="0">
-                <a:latin typeface="Times New Roman" panose="02020603050405020304" pitchFamily="18" charset="0"/>
-                <a:cs typeface="Times New Roman" panose="02020603050405020304" pitchFamily="18" charset="0"/>
-              </a:rPr>
-              <a:t>WE – Write Enable</a:t>
-            </a:r>
-            <a:endParaRPr lang="ru-RU" dirty="0">
-              <a:latin typeface="Times New Roman" panose="02020603050405020304" pitchFamily="18" charset="0"/>
-              <a:cs typeface="Times New Roman" panose="02020603050405020304" pitchFamily="18" charset="0"/>
-            </a:endParaRPr>
-          </a:p>
-        </p:txBody>
-      </p:sp>
-      <p:cxnSp>
-        <p:nvCxnSpPr>
-          <p:cNvPr id="18" name="Straight Arrow Connector 17"/>
-          <p:cNvCxnSpPr/>
+              <a:rPr lang="en-US" dirty="0"/>
+              <a:t>3</a:t>
+            </a:r>
+            <a:endParaRPr lang="ru-RU" dirty="0"/>
+          </a:p>
+        </p:txBody>
+      </p:sp>
+      <p:sp>
+        <p:nvSpPr>
+          <p:cNvPr id="26" name="TextBox 25"/>
+          <p:cNvSpPr txBox="1"/>
           <p:nvPr/>
-        </p:nvCxnSpPr>
-        <p:spPr>
-          <a:xfrm>
-            <a:off x="1096818" y="2743200"/>
-            <a:ext cx="0" cy="1233054"/>
-          </a:xfrm>
-          <a:prstGeom prst="straightConnector1">
-            <a:avLst/>
-          </a:prstGeom>
-          <a:ln>
-            <a:tailEnd type="triangle"/>
-          </a:ln>
-        </p:spPr>
-        <p:style>
-          <a:lnRef idx="1">
-            <a:schemeClr val="accent1"/>
-          </a:lnRef>
-          <a:fillRef idx="0">
-            <a:schemeClr val="accent1"/>
-          </a:fillRef>
-          <a:effectRef idx="0">
-            <a:schemeClr val="accent1"/>
-          </a:effectRef>
-          <a:fontRef idx="minor">
-            <a:schemeClr val="tx1"/>
-          </a:fontRef>
-        </p:style>
-      </p:cxnSp>
-      <p:sp>
-        <p:nvSpPr>
-          <p:cNvPr id="20" name="Rectangle 19"/>
-          <p:cNvSpPr/>
-          <p:nvPr/>
-        </p:nvSpPr>
-        <p:spPr>
-          <a:xfrm>
-            <a:off x="2152071" y="2286555"/>
-            <a:ext cx="1290780" cy="455424"/>
+        </p:nvSpPr>
+        <p:spPr>
+          <a:xfrm>
+            <a:off x="2660082" y="1806409"/>
+            <a:ext cx="272472" cy="369332"/>
           </a:xfrm>
           <a:prstGeom prst="rect">
             <a:avLst/>
           </a:prstGeom>
           <a:noFill/>
-          <a:ln w="25400">
-            <a:solidFill>
-              <a:schemeClr val="tx1"/>
-            </a:solidFill>
-          </a:ln>
-        </p:spPr>
-        <p:style>
-          <a:lnRef idx="2">
-            <a:schemeClr val="accent1">
-              <a:shade val="50000"/>
-            </a:schemeClr>
-          </a:lnRef>
-          <a:fillRef idx="1">
-            <a:schemeClr val="accent1"/>
-          </a:fillRef>
-          <a:effectRef idx="0">
-            <a:schemeClr val="accent1"/>
-          </a:effectRef>
-          <a:fontRef idx="minor">
-            <a:schemeClr val="lt1"/>
-          </a:fontRef>
-        </p:style>
-        <p:txBody>
-          <a:bodyPr rtlCol="0" anchor="ctr"/>
-          <a:lstStyle/>
-          <a:p>
-            <a:pPr algn="ctr"/>
-            <a:r>
-              <a:rPr lang="ru-RU" dirty="0" smtClean="0">
-                <a:solidFill>
-                  <a:schemeClr val="tx1"/>
-                </a:solidFill>
-              </a:rPr>
-              <a:t>2</a:t>
-            </a:r>
-            <a:r>
-              <a:rPr lang="en-US" dirty="0" smtClean="0">
-                <a:solidFill>
-                  <a:schemeClr val="tx1"/>
-                </a:solidFill>
-              </a:rPr>
-              <a:t>7</a:t>
-            </a:r>
-            <a:r>
-              <a:rPr lang="ru-RU" dirty="0" smtClean="0">
-                <a:solidFill>
-                  <a:schemeClr val="tx1"/>
-                </a:solidFill>
-              </a:rPr>
-              <a:t>-2</a:t>
-            </a:r>
-            <a:r>
-              <a:rPr lang="en-US" dirty="0" smtClean="0">
-                <a:solidFill>
-                  <a:schemeClr val="tx1"/>
-                </a:solidFill>
-              </a:rPr>
-              <a:t>4</a:t>
-            </a:r>
-            <a:endParaRPr lang="ru-RU" dirty="0">
-              <a:solidFill>
-                <a:schemeClr val="tx1"/>
-              </a:solidFill>
-            </a:endParaRPr>
-          </a:p>
-        </p:txBody>
-      </p:sp>
-      <p:sp>
-        <p:nvSpPr>
-          <p:cNvPr id="23" name="TextBox 22"/>
-          <p:cNvSpPr txBox="1"/>
-          <p:nvPr/>
-        </p:nvSpPr>
-        <p:spPr>
-          <a:xfrm>
-            <a:off x="535707" y="1833602"/>
-            <a:ext cx="272472" cy="369332"/>
-          </a:xfrm>
-          <a:prstGeom prst="rect">
-            <a:avLst/>
-          </a:prstGeom>
-          <a:noFill/>
         </p:spPr>
         <p:txBody>
           <a:bodyPr wrap="square" rtlCol="0">
@@ -3559,96 +3509,6 @@
           <a:p>
             <a:r>
               <a:rPr lang="en-US" dirty="0"/>
-              <a:t>1</a:t>
-            </a:r>
-            <a:endParaRPr lang="ru-RU" dirty="0"/>
-          </a:p>
-        </p:txBody>
-      </p:sp>
-      <p:sp>
-        <p:nvSpPr>
-          <p:cNvPr id="24" name="TextBox 23"/>
-          <p:cNvSpPr txBox="1"/>
-          <p:nvPr/>
-        </p:nvSpPr>
-        <p:spPr>
-          <a:xfrm>
-            <a:off x="967508" y="1833602"/>
-            <a:ext cx="272472" cy="369332"/>
-          </a:xfrm>
-          <a:prstGeom prst="rect">
-            <a:avLst/>
-          </a:prstGeom>
-          <a:noFill/>
-        </p:spPr>
-        <p:txBody>
-          <a:bodyPr wrap="square" rtlCol="0">
-            <a:spAutoFit/>
-          </a:bodyPr>
-          <a:lstStyle/>
-          <a:p>
-            <a:r>
-              <a:rPr lang="en-US" dirty="0"/>
-              <a:t>1</a:t>
-            </a:r>
-            <a:endParaRPr lang="ru-RU" dirty="0"/>
-          </a:p>
-        </p:txBody>
-      </p:sp>
-      <p:sp>
-        <p:nvSpPr>
-          <p:cNvPr id="25" name="TextBox 24"/>
-          <p:cNvSpPr txBox="1"/>
-          <p:nvPr/>
-        </p:nvSpPr>
-        <p:spPr>
-          <a:xfrm>
-            <a:off x="1600199" y="1822550"/>
-            <a:ext cx="272472" cy="369332"/>
-          </a:xfrm>
-          <a:prstGeom prst="rect">
-            <a:avLst/>
-          </a:prstGeom>
-          <a:noFill/>
-        </p:spPr>
-        <p:txBody>
-          <a:bodyPr wrap="square" rtlCol="0">
-            <a:spAutoFit/>
-          </a:bodyPr>
-          <a:lstStyle/>
-          <a:p>
-            <a:r>
-              <a:rPr lang="en-US" dirty="0" smtClean="0"/>
-              <a:t>2</a:t>
-            </a:r>
-            <a:endParaRPr lang="ru-RU" dirty="0"/>
-          </a:p>
-        </p:txBody>
-      </p:sp>
-      <p:sp>
-        <p:nvSpPr>
-          <p:cNvPr id="26" name="TextBox 25"/>
-          <p:cNvSpPr txBox="1"/>
-          <p:nvPr/>
-        </p:nvSpPr>
-        <p:spPr>
-          <a:xfrm>
-            <a:off x="2660082" y="1806409"/>
-            <a:ext cx="272472" cy="369332"/>
-          </a:xfrm>
-          <a:prstGeom prst="rect">
-            <a:avLst/>
-          </a:prstGeom>
-          <a:noFill/>
-        </p:spPr>
-        <p:txBody>
-          <a:bodyPr wrap="square" rtlCol="0">
-            <a:spAutoFit/>
-          </a:bodyPr>
-          <a:lstStyle/>
-          <a:p>
-            <a:r>
-              <a:rPr lang="en-US" dirty="0"/>
               <a:t>4</a:t>
             </a:r>
             <a:endParaRPr lang="ru-RU" dirty="0"/>
@@ -3663,8 +3523,8 @@
         </p:nvSpPr>
         <p:spPr>
           <a:xfrm>
-            <a:off x="2279068" y="1938005"/>
-            <a:ext cx="207824" cy="1985179"/>
+            <a:off x="2085360" y="1686588"/>
+            <a:ext cx="221189" cy="2488012"/>
           </a:xfrm>
           <a:prstGeom prst="leftBrace">
             <a:avLst/>
@@ -3707,9 +3567,9 @@
           <p:nvPr/>
         </p:nvCxnSpPr>
         <p:spPr>
-          <a:xfrm flipH="1">
-            <a:off x="2355272" y="3098800"/>
-            <a:ext cx="2309" cy="1630218"/>
+          <a:xfrm>
+            <a:off x="2170991" y="3097579"/>
+            <a:ext cx="9501" cy="1138359"/>
           </a:xfrm>
           <a:prstGeom prst="straightConnector1">
             <a:avLst/>
@@ -3741,8 +3601,8 @@
         </p:nvSpPr>
         <p:spPr>
           <a:xfrm>
-            <a:off x="2244434" y="4745304"/>
-            <a:ext cx="6082148" cy="369332"/>
+            <a:off x="535707" y="4456214"/>
+            <a:ext cx="6082148" cy="646331"/>
           </a:xfrm>
           <a:prstGeom prst="rect">
             <a:avLst/>
@@ -3760,21 +3620,37 @@
                 <a:latin typeface="Times New Roman" panose="02020603050405020304" pitchFamily="18" charset="0"/>
                 <a:cs typeface="Times New Roman" panose="02020603050405020304" pitchFamily="18" charset="0"/>
               </a:rPr>
-              <a:t>Full op code (2 bit for </a:t>
-            </a:r>
-            <a:r>
-              <a:rPr lang="en-US" dirty="0" err="1" smtClean="0">
+              <a:t>Full op code (3 bit for pipe id and 4 for real op code)</a:t>
+            </a:r>
+          </a:p>
+          <a:p>
+            <a:r>
+              <a:rPr lang="en-US" dirty="0">
                 <a:latin typeface="Times New Roman" panose="02020603050405020304" pitchFamily="18" charset="0"/>
                 <a:cs typeface="Times New Roman" panose="02020603050405020304" pitchFamily="18" charset="0"/>
               </a:rPr>
-              <a:t>cmd</a:t>
+              <a:t>For </a:t>
             </a:r>
             <a:r>
               <a:rPr lang="en-US" dirty="0" smtClean="0">
                 <a:latin typeface="Times New Roman" panose="02020603050405020304" pitchFamily="18" charset="0"/>
                 <a:cs typeface="Times New Roman" panose="02020603050405020304" pitchFamily="18" charset="0"/>
               </a:rPr>
-              <a:t> class and 4 for real op code)</a:t>
+              <a:t>ALU instructions 30—28 </a:t>
+            </a:r>
+            <a:r>
+              <a:rPr lang="en-US" dirty="0">
+                <a:latin typeface="Times New Roman" panose="02020603050405020304" pitchFamily="18" charset="0"/>
+                <a:cs typeface="Times New Roman" panose="02020603050405020304" pitchFamily="18" charset="0"/>
+              </a:rPr>
+              <a:t>bits are equal to “</a:t>
+            </a:r>
+            <a:r>
+              <a:rPr lang="en-US" dirty="0" smtClean="0">
+                <a:latin typeface="Times New Roman" panose="02020603050405020304" pitchFamily="18" charset="0"/>
+                <a:cs typeface="Times New Roman" panose="02020603050405020304" pitchFamily="18" charset="0"/>
+              </a:rPr>
+              <a:t>000”</a:t>
             </a:r>
             <a:endParaRPr lang="ru-RU" dirty="0">
               <a:latin typeface="Times New Roman" panose="02020603050405020304" pitchFamily="18" charset="0"/>
@@ -3834,12 +3710,12 @@
               <a:t>2</a:t>
             </a:r>
             <a:r>
-              <a:rPr lang="en-US" dirty="0">
+              <a:rPr lang="en-US" dirty="0" smtClean="0">
                 <a:solidFill>
                   <a:schemeClr val="tx1"/>
                 </a:solidFill>
               </a:rPr>
-              <a:t>3</a:t>
+              <a:t>3 </a:t>
             </a:r>
             <a:r>
               <a:rPr lang="ru-RU" dirty="0" smtClean="0">
@@ -3847,7 +3723,23 @@
                   <a:schemeClr val="tx1"/>
                 </a:solidFill>
               </a:rPr>
-              <a:t>-2</a:t>
+              <a:t>-</a:t>
+            </a:r>
+            <a:r>
+              <a:rPr lang="en-US" dirty="0" smtClean="0">
+                <a:solidFill>
+                  <a:schemeClr val="tx1"/>
+                </a:solidFill>
+              </a:rPr>
+              <a:t>- </a:t>
+            </a:r>
+            <a:r>
+              <a:rPr lang="ru-RU" dirty="0" smtClean="0">
+                <a:solidFill>
+                  <a:schemeClr val="tx1"/>
+                </a:solidFill>
+              </a:rPr>
+              <a:t>2</a:t>
             </a:r>
             <a:r>
               <a:rPr lang="en-US" dirty="0">
@@ -3913,7 +3805,7 @@
                   <a:schemeClr val="tx1"/>
                 </a:solidFill>
               </a:rPr>
-              <a:t>19</a:t>
+              <a:t>19 </a:t>
             </a:r>
             <a:r>
               <a:rPr lang="ru-RU" dirty="0" smtClean="0">
@@ -3929,7 +3821,7 @@
                   <a:schemeClr val="tx1"/>
                 </a:solidFill>
               </a:rPr>
-              <a:t>17</a:t>
+              <a:t>- 17</a:t>
             </a:r>
             <a:endParaRPr lang="ru-RU" dirty="0">
               <a:solidFill>
@@ -3987,7 +3879,7 @@
                   <a:schemeClr val="tx1"/>
                 </a:solidFill>
               </a:rPr>
-              <a:t>16</a:t>
+              <a:t>16 </a:t>
             </a:r>
             <a:r>
               <a:rPr lang="ru-RU" dirty="0" smtClean="0">
@@ -4003,7 +3895,7 @@
                   <a:schemeClr val="tx1"/>
                 </a:solidFill>
               </a:rPr>
-              <a:t>13</a:t>
+              <a:t>- 13</a:t>
             </a:r>
             <a:endParaRPr lang="ru-RU" dirty="0">
               <a:solidFill>
@@ -4756,6 +4648,74 @@
               <a:latin typeface="Courier New" panose="02070309020205020404" pitchFamily="49" charset="0"/>
               <a:cs typeface="Courier New" panose="02070309020205020404" pitchFamily="49" charset="0"/>
             </a:endParaRPr>
+          </a:p>
+        </p:txBody>
+      </p:sp>
+      <p:sp>
+        <p:nvSpPr>
+          <p:cNvPr id="51" name="TextBox 50"/>
+          <p:cNvSpPr txBox="1"/>
+          <p:nvPr/>
+        </p:nvSpPr>
+        <p:spPr>
+          <a:xfrm>
+            <a:off x="8237674" y="1192291"/>
+            <a:ext cx="272472" cy="369332"/>
+          </a:xfrm>
+          <a:prstGeom prst="rect">
+            <a:avLst/>
+          </a:prstGeom>
+          <a:noFill/>
+        </p:spPr>
+        <p:txBody>
+          <a:bodyPr wrap="square" rtlCol="0">
+            <a:spAutoFit/>
+          </a:bodyPr>
+          <a:lstStyle/>
+          <a:p>
+            <a:r>
+              <a:rPr lang="en-US" dirty="0" smtClean="0"/>
+              <a:t>8</a:t>
+            </a:r>
+            <a:endParaRPr lang="ru-RU" dirty="0"/>
+          </a:p>
+        </p:txBody>
+      </p:sp>
+      <p:sp>
+        <p:nvSpPr>
+          <p:cNvPr id="8" name="Left Brace 7"/>
+          <p:cNvSpPr/>
+          <p:nvPr/>
+        </p:nvSpPr>
+        <p:spPr>
+          <a:xfrm rot="5400000">
+            <a:off x="8187090" y="577480"/>
+            <a:ext cx="359761" cy="2351229"/>
+          </a:xfrm>
+          <a:prstGeom prst="leftBrace">
+            <a:avLst/>
+          </a:prstGeom>
+        </p:spPr>
+        <p:style>
+          <a:lnRef idx="1">
+            <a:schemeClr val="accent1"/>
+          </a:lnRef>
+          <a:fillRef idx="0">
+            <a:schemeClr val="accent1"/>
+          </a:fillRef>
+          <a:effectRef idx="0">
+            <a:schemeClr val="accent1"/>
+          </a:effectRef>
+          <a:fontRef idx="minor">
+            <a:schemeClr val="tx1"/>
+          </a:fontRef>
+        </p:style>
+        <p:txBody>
+          <a:bodyPr rtlCol="0" anchor="ctr"/>
+          <a:lstStyle/>
+          <a:p>
+            <a:pPr algn="ctr"/>
+            <a:endParaRPr lang="ru-RU"/>
           </a:p>
         </p:txBody>
       </p:sp>
@@ -4927,14 +4887,14 @@
       </p:sp>
       <p:sp>
         <p:nvSpPr>
-          <p:cNvPr id="7" name="Rectangle 6"/>
+          <p:cNvPr id="10" name="Rectangle 9"/>
           <p:cNvSpPr/>
           <p:nvPr/>
         </p:nvSpPr>
         <p:spPr>
           <a:xfrm>
-            <a:off x="905163" y="2287777"/>
-            <a:ext cx="415636" cy="455424"/>
+            <a:off x="902854" y="2287776"/>
+            <a:ext cx="1249217" cy="455424"/>
           </a:xfrm>
           <a:prstGeom prst="rect">
             <a:avLst/>
@@ -4968,12 +4928,20 @@
           <a:p>
             <a:pPr algn="ctr"/>
             <a:r>
+              <a:rPr lang="en-US" dirty="0">
+                <a:solidFill>
+                  <a:schemeClr val="tx1"/>
+                </a:solidFill>
+              </a:rPr>
+              <a:t>30 -- </a:t>
+            </a:r>
+            <a:r>
               <a:rPr lang="ru-RU" dirty="0" smtClean="0">
                 <a:solidFill>
                   <a:schemeClr val="tx1"/>
                 </a:solidFill>
               </a:rPr>
-              <a:t>30</a:t>
+              <a:t>28</a:t>
             </a:r>
             <a:endParaRPr lang="ru-RU" dirty="0">
               <a:solidFill>
@@ -4983,16 +4951,117 @@
           </a:p>
         </p:txBody>
       </p:sp>
-      <p:sp>
-        <p:nvSpPr>
-          <p:cNvPr id="10" name="Rectangle 9"/>
+      <p:cxnSp>
+        <p:nvCxnSpPr>
+          <p:cNvPr id="13" name="Straight Arrow Connector 12"/>
+          <p:cNvCxnSpPr>
+            <a:stCxn id="6" idx="2"/>
+          </p:cNvCxnSpPr>
+          <p:nvPr/>
+        </p:nvCxnSpPr>
+        <p:spPr>
+          <a:xfrm flipH="1">
+            <a:off x="695036" y="2743200"/>
+            <a:ext cx="2309" cy="711200"/>
+          </a:xfrm>
+          <a:prstGeom prst="straightConnector1">
+            <a:avLst/>
+          </a:prstGeom>
+          <a:ln>
+            <a:tailEnd type="triangle"/>
+          </a:ln>
+        </p:spPr>
+        <p:style>
+          <a:lnRef idx="1">
+            <a:schemeClr val="accent1"/>
+          </a:lnRef>
+          <a:fillRef idx="0">
+            <a:schemeClr val="accent1"/>
+          </a:fillRef>
+          <a:effectRef idx="0">
+            <a:schemeClr val="accent1"/>
+          </a:effectRef>
+          <a:fontRef idx="minor">
+            <a:schemeClr val="tx1"/>
+          </a:fontRef>
+        </p:style>
+      </p:cxnSp>
+      <p:sp>
+        <p:nvSpPr>
+          <p:cNvPr id="15" name="TextBox 14"/>
+          <p:cNvSpPr txBox="1"/>
+          <p:nvPr/>
+        </p:nvSpPr>
+        <p:spPr>
+          <a:xfrm>
+            <a:off x="535707" y="3454400"/>
+            <a:ext cx="7666184" cy="646331"/>
+          </a:xfrm>
+          <a:prstGeom prst="rect">
+            <a:avLst/>
+          </a:prstGeom>
+          <a:noFill/>
+        </p:spPr>
+        <p:txBody>
+          <a:bodyPr wrap="square" rtlCol="0">
+            <a:spAutoFit/>
+          </a:bodyPr>
+          <a:lstStyle/>
+          <a:p>
+            <a:r>
+              <a:rPr lang="en-US" dirty="0" smtClean="0">
+                <a:latin typeface="Times New Roman" panose="02020603050405020304" pitchFamily="18" charset="0"/>
+                <a:cs typeface="Times New Roman" panose="02020603050405020304" pitchFamily="18" charset="0"/>
+              </a:rPr>
+              <a:t>I</a:t>
+            </a:r>
+            <a:r>
+              <a:rPr lang="en-US" dirty="0">
+                <a:latin typeface="Times New Roman" panose="02020603050405020304" pitchFamily="18" charset="0"/>
+                <a:cs typeface="Times New Roman" panose="02020603050405020304" pitchFamily="18" charset="0"/>
+              </a:rPr>
+              <a:t> </a:t>
+            </a:r>
+            <a:r>
+              <a:rPr lang="en-US" dirty="0" smtClean="0">
+                <a:latin typeface="Times New Roman" panose="02020603050405020304" pitchFamily="18" charset="0"/>
+                <a:cs typeface="Times New Roman" panose="02020603050405020304" pitchFamily="18" charset="0"/>
+              </a:rPr>
+              <a:t>– flag (if set, this command is immediate, next one is 32 bit data );</a:t>
+            </a:r>
+          </a:p>
+          <a:p>
+            <a:r>
+              <a:rPr lang="en-US" dirty="0">
+                <a:latin typeface="Times New Roman" panose="02020603050405020304" pitchFamily="18" charset="0"/>
+                <a:cs typeface="Times New Roman" panose="02020603050405020304" pitchFamily="18" charset="0"/>
+              </a:rPr>
+              <a:t>Immediate commands don’t use R2 field</a:t>
+            </a:r>
+            <a:r>
+              <a:rPr lang="en-US" dirty="0" smtClean="0">
+                <a:latin typeface="Times New Roman" panose="02020603050405020304" pitchFamily="18" charset="0"/>
+                <a:cs typeface="Times New Roman" panose="02020603050405020304" pitchFamily="18" charset="0"/>
+              </a:rPr>
+              <a:t>;</a:t>
+            </a:r>
+            <a:endParaRPr lang="ru-RU" dirty="0">
+              <a:latin typeface="Times New Roman" panose="02020603050405020304" pitchFamily="18" charset="0"/>
+              <a:cs typeface="Times New Roman" panose="02020603050405020304" pitchFamily="18" charset="0"/>
+            </a:endParaRPr>
+          </a:p>
+        </p:txBody>
+      </p:sp>
+      <p:sp>
+        <p:nvSpPr>
+          <p:cNvPr id="20" name="Rectangle 19"/>
           <p:cNvSpPr/>
           <p:nvPr/>
         </p:nvSpPr>
         <p:spPr>
           <a:xfrm>
-            <a:off x="1320799" y="2287776"/>
-            <a:ext cx="831272" cy="455424"/>
+            <a:off x="2152071" y="2286555"/>
+            <a:ext cx="1290780" cy="455424"/>
           </a:xfrm>
           <a:prstGeom prst="rect">
             <a:avLst/>
@@ -5031,7 +5100,47 @@
                   <a:schemeClr val="tx1"/>
                 </a:solidFill>
               </a:rPr>
-              <a:t>29-28</a:t>
+              <a:t>2</a:t>
+            </a:r>
+            <a:r>
+              <a:rPr lang="en-US" dirty="0" smtClean="0">
+                <a:solidFill>
+                  <a:schemeClr val="tx1"/>
+                </a:solidFill>
+              </a:rPr>
+              <a:t>7 -</a:t>
+            </a:r>
+            <a:r>
+              <a:rPr lang="ru-RU" dirty="0" smtClean="0">
+                <a:solidFill>
+                  <a:schemeClr val="tx1"/>
+                </a:solidFill>
+              </a:rPr>
+              <a:t>-</a:t>
+            </a:r>
+            <a:r>
+              <a:rPr lang="en-US" dirty="0" smtClean="0">
+                <a:solidFill>
+                  <a:schemeClr val="tx1"/>
+                </a:solidFill>
+              </a:rPr>
+              <a:t> </a:t>
+            </a:r>
+            <a:r>
+              <a:rPr lang="ru-RU" dirty="0" smtClean="0">
+                <a:solidFill>
+                  <a:schemeClr val="tx1"/>
+                </a:solidFill>
+              </a:rPr>
+              <a:t>2</a:t>
+            </a:r>
+            <a:r>
+              <a:rPr lang="en-US" dirty="0" smtClean="0">
+                <a:solidFill>
+                  <a:schemeClr val="tx1"/>
+                </a:solidFill>
+              </a:rPr>
+              <a:t>4</a:t>
             </a:r>
             <a:endParaRPr lang="ru-RU" dirty="0">
               <a:solidFill>
@@ -5041,18 +5150,76 @@
           </a:p>
         </p:txBody>
       </p:sp>
+      <p:sp>
+        <p:nvSpPr>
+          <p:cNvPr id="23" name="TextBox 22"/>
+          <p:cNvSpPr txBox="1"/>
+          <p:nvPr/>
+        </p:nvSpPr>
+        <p:spPr>
+          <a:xfrm>
+            <a:off x="535707" y="1833602"/>
+            <a:ext cx="272472" cy="369332"/>
+          </a:xfrm>
+          <a:prstGeom prst="rect">
+            <a:avLst/>
+          </a:prstGeom>
+          <a:noFill/>
+        </p:spPr>
+        <p:txBody>
+          <a:bodyPr wrap="square" rtlCol="0">
+            <a:spAutoFit/>
+          </a:bodyPr>
+          <a:lstStyle/>
+          <a:p>
+            <a:r>
+              <a:rPr lang="en-US" dirty="0"/>
+              <a:t>1</a:t>
+            </a:r>
+            <a:endParaRPr lang="ru-RU" dirty="0"/>
+          </a:p>
+        </p:txBody>
+      </p:sp>
+      <p:sp>
+        <p:nvSpPr>
+          <p:cNvPr id="26" name="TextBox 25"/>
+          <p:cNvSpPr txBox="1"/>
+          <p:nvPr/>
+        </p:nvSpPr>
+        <p:spPr>
+          <a:xfrm>
+            <a:off x="2660082" y="1806409"/>
+            <a:ext cx="272472" cy="369332"/>
+          </a:xfrm>
+          <a:prstGeom prst="rect">
+            <a:avLst/>
+          </a:prstGeom>
+          <a:noFill/>
+        </p:spPr>
+        <p:txBody>
+          <a:bodyPr wrap="square" rtlCol="0">
+            <a:spAutoFit/>
+          </a:bodyPr>
+          <a:lstStyle/>
+          <a:p>
+            <a:r>
+              <a:rPr lang="en-US" dirty="0"/>
+              <a:t>4</a:t>
+            </a:r>
+            <a:endParaRPr lang="ru-RU" dirty="0"/>
+          </a:p>
+        </p:txBody>
+      </p:sp>
       <p:cxnSp>
         <p:nvCxnSpPr>
-          <p:cNvPr id="13" name="Straight Arrow Connector 12"/>
-          <p:cNvCxnSpPr>
-            <a:stCxn id="6" idx="2"/>
-          </p:cNvCxnSpPr>
+          <p:cNvPr id="29" name="Straight Arrow Connector 28"/>
+          <p:cNvCxnSpPr/>
           <p:nvPr/>
         </p:nvCxnSpPr>
         <p:spPr>
-          <a:xfrm flipH="1">
-            <a:off x="695036" y="2743200"/>
-            <a:ext cx="2309" cy="711200"/>
+          <a:xfrm>
+            <a:off x="2215662" y="3080987"/>
+            <a:ext cx="3908" cy="1093613"/>
           </a:xfrm>
           <a:prstGeom prst="straightConnector1">
             <a:avLst/>
@@ -5078,14 +5245,14 @@
       </p:cxnSp>
       <p:sp>
         <p:nvSpPr>
-          <p:cNvPr id="15" name="TextBox 14"/>
+          <p:cNvPr id="31" name="TextBox 30"/>
           <p:cNvSpPr txBox="1"/>
           <p:nvPr/>
         </p:nvSpPr>
         <p:spPr>
           <a:xfrm>
-            <a:off x="535707" y="3454400"/>
-            <a:ext cx="7666184" cy="369332"/>
+            <a:off x="521851" y="4365476"/>
+            <a:ext cx="6082148" cy="646331"/>
           </a:xfrm>
           <a:prstGeom prst="rect">
             <a:avLst/>
@@ -5103,21 +5270,16 @@
                 <a:latin typeface="Times New Roman" panose="02020603050405020304" pitchFamily="18" charset="0"/>
                 <a:cs typeface="Times New Roman" panose="02020603050405020304" pitchFamily="18" charset="0"/>
               </a:rPr>
-              <a:t>I</a:t>
-            </a:r>
-            <a:r>
-              <a:rPr lang="en-US" dirty="0">
-                <a:latin typeface="Times New Roman" panose="02020603050405020304" pitchFamily="18" charset="0"/>
-                <a:cs typeface="Times New Roman" panose="02020603050405020304" pitchFamily="18" charset="0"/>
-              </a:rPr>
-              <a:t> </a:t>
-            </a:r>
+              <a:t>Full op code (3 bit for pipe id and 4 for real op code);</a:t>
+            </a:r>
+          </a:p>
+          <a:p>
             <a:r>
               <a:rPr lang="en-US" dirty="0" smtClean="0">
                 <a:latin typeface="Times New Roman" panose="02020603050405020304" pitchFamily="18" charset="0"/>
                 <a:cs typeface="Times New Roman" panose="02020603050405020304" pitchFamily="18" charset="0"/>
               </a:rPr>
-              <a:t>– flag (if set, this command is immediate, next one is 32 bit data )</a:t>
+              <a:t>For MEM instructions 30—28 bits are equal to “010”;</a:t>
             </a:r>
             <a:endParaRPr lang="ru-RU" dirty="0">
               <a:latin typeface="Times New Roman" panose="02020603050405020304" pitchFamily="18" charset="0"/>
@@ -5128,83 +5290,14 @@
       </p:sp>
       <p:sp>
         <p:nvSpPr>
-          <p:cNvPr id="17" name="TextBox 16"/>
-          <p:cNvSpPr txBox="1"/>
-          <p:nvPr/>
-        </p:nvSpPr>
-        <p:spPr>
-          <a:xfrm>
-            <a:off x="808180" y="3976254"/>
-            <a:ext cx="7666184" cy="369332"/>
-          </a:xfrm>
-          <a:prstGeom prst="rect">
-            <a:avLst/>
-          </a:prstGeom>
-          <a:noFill/>
-        </p:spPr>
-        <p:txBody>
-          <a:bodyPr wrap="square" rtlCol="0">
-            <a:spAutoFit/>
-          </a:bodyPr>
-          <a:lstStyle/>
-          <a:p>
-            <a:r>
-              <a:rPr lang="en-US" dirty="0" smtClean="0">
-                <a:latin typeface="Times New Roman" panose="02020603050405020304" pitchFamily="18" charset="0"/>
-                <a:cs typeface="Times New Roman" panose="02020603050405020304" pitchFamily="18" charset="0"/>
-              </a:rPr>
-              <a:t>WE – Write Enable</a:t>
-            </a:r>
-            <a:endParaRPr lang="ru-RU" dirty="0">
-              <a:latin typeface="Times New Roman" panose="02020603050405020304" pitchFamily="18" charset="0"/>
-              <a:cs typeface="Times New Roman" panose="02020603050405020304" pitchFamily="18" charset="0"/>
-            </a:endParaRPr>
-          </a:p>
-        </p:txBody>
-      </p:sp>
-      <p:cxnSp>
-        <p:nvCxnSpPr>
-          <p:cNvPr id="18" name="Straight Arrow Connector 17"/>
-          <p:cNvCxnSpPr/>
-          <p:nvPr/>
-        </p:nvCxnSpPr>
-        <p:spPr>
-          <a:xfrm>
-            <a:off x="1096818" y="2743200"/>
-            <a:ext cx="0" cy="1233054"/>
-          </a:xfrm>
-          <a:prstGeom prst="straightConnector1">
-            <a:avLst/>
-          </a:prstGeom>
-          <a:ln>
-            <a:tailEnd type="triangle"/>
-          </a:ln>
-        </p:spPr>
-        <p:style>
-          <a:lnRef idx="1">
-            <a:schemeClr val="accent1"/>
-          </a:lnRef>
-          <a:fillRef idx="0">
-            <a:schemeClr val="accent1"/>
-          </a:fillRef>
-          <a:effectRef idx="0">
-            <a:schemeClr val="accent1"/>
-          </a:effectRef>
-          <a:fontRef idx="minor">
-            <a:schemeClr val="tx1"/>
-          </a:fontRef>
-        </p:style>
-      </p:cxnSp>
-      <p:sp>
-        <p:nvSpPr>
-          <p:cNvPr id="20" name="Rectangle 19"/>
+          <p:cNvPr id="32" name="Rectangle 31"/>
           <p:cNvSpPr/>
           <p:nvPr/>
         </p:nvSpPr>
         <p:spPr>
           <a:xfrm>
-            <a:off x="2152071" y="2286555"/>
-            <a:ext cx="1290780" cy="455424"/>
+            <a:off x="3445162" y="2290618"/>
+            <a:ext cx="1221513" cy="450140"/>
           </a:xfrm>
           <a:prstGeom prst="rect">
             <a:avLst/>
@@ -5251,7 +5344,7 @@
                   <a:schemeClr val="tx1"/>
                 </a:solidFill>
               </a:rPr>
-              <a:t>7</a:t>
+              <a:t>3 -</a:t>
             </a:r>
             <a:r>
               <a:rPr lang="ru-RU" dirty="0" smtClean="0">
@@ -5259,7 +5352,7 @@
                   <a:schemeClr val="tx1"/>
                 </a:solidFill>
               </a:rPr>
-              <a:t>-2</a:t>
+              <a:t>-</a:t>
             </a:r>
             <a:r>
               <a:rPr lang="en-US" dirty="0" smtClean="0">
@@ -5267,7 +5360,23 @@
                   <a:schemeClr val="tx1"/>
                 </a:solidFill>
               </a:rPr>
-              <a:t>4</a:t>
+              <a:t> </a:t>
+            </a:r>
+            <a:r>
+              <a:rPr lang="ru-RU" dirty="0" smtClean="0">
+                <a:solidFill>
+                  <a:schemeClr val="tx1"/>
+                </a:solidFill>
+              </a:rPr>
+              <a:t>2</a:t>
+            </a:r>
+            <a:r>
+              <a:rPr lang="en-US" dirty="0">
+                <a:solidFill>
+                  <a:schemeClr val="tx1"/>
+                </a:solidFill>
+              </a:rPr>
+              <a:t>0</a:t>
             </a:r>
             <a:endParaRPr lang="ru-RU" dirty="0">
               <a:solidFill>
@@ -5279,73 +5388,161 @@
       </p:sp>
       <p:sp>
         <p:nvSpPr>
-          <p:cNvPr id="23" name="TextBox 22"/>
-          <p:cNvSpPr txBox="1"/>
+          <p:cNvPr id="33" name="Rectangle 32"/>
+          <p:cNvSpPr/>
           <p:nvPr/>
         </p:nvSpPr>
         <p:spPr>
           <a:xfrm>
-            <a:off x="535707" y="1833602"/>
-            <a:ext cx="272472" cy="369332"/>
+            <a:off x="4666675" y="2286555"/>
+            <a:ext cx="1249207" cy="454203"/>
           </a:xfrm>
           <a:prstGeom prst="rect">
             <a:avLst/>
           </a:prstGeom>
           <a:noFill/>
-        </p:spPr>
-        <p:txBody>
-          <a:bodyPr wrap="square" rtlCol="0">
-            <a:spAutoFit/>
-          </a:bodyPr>
-          <a:lstStyle/>
-          <a:p>
-            <a:r>
-              <a:rPr lang="en-US" dirty="0"/>
-              <a:t>1</a:t>
-            </a:r>
-            <a:endParaRPr lang="ru-RU" dirty="0"/>
-          </a:p>
-        </p:txBody>
-      </p:sp>
-      <p:sp>
-        <p:nvSpPr>
-          <p:cNvPr id="24" name="TextBox 23"/>
-          <p:cNvSpPr txBox="1"/>
+          <a:ln w="25400">
+            <a:solidFill>
+              <a:schemeClr val="tx1"/>
+            </a:solidFill>
+          </a:ln>
+        </p:spPr>
+        <p:style>
+          <a:lnRef idx="2">
+            <a:schemeClr val="accent1">
+              <a:shade val="50000"/>
+            </a:schemeClr>
+          </a:lnRef>
+          <a:fillRef idx="1">
+            <a:schemeClr val="accent1"/>
+          </a:fillRef>
+          <a:effectRef idx="0">
+            <a:schemeClr val="accent1"/>
+          </a:effectRef>
+          <a:fontRef idx="minor">
+            <a:schemeClr val="lt1"/>
+          </a:fontRef>
+        </p:style>
+        <p:txBody>
+          <a:bodyPr rtlCol="0" anchor="ctr"/>
+          <a:lstStyle/>
+          <a:p>
+            <a:pPr algn="ctr"/>
+            <a:r>
+              <a:rPr lang="en-US" dirty="0" smtClean="0">
+                <a:solidFill>
+                  <a:schemeClr val="tx1"/>
+                </a:solidFill>
+              </a:rPr>
+              <a:t>19 -</a:t>
+            </a:r>
+            <a:r>
+              <a:rPr lang="ru-RU" dirty="0" smtClean="0">
+                <a:solidFill>
+                  <a:schemeClr val="tx1"/>
+                </a:solidFill>
+              </a:rPr>
+              <a:t>-</a:t>
+            </a:r>
+            <a:r>
+              <a:rPr lang="en-US" dirty="0" smtClean="0">
+                <a:solidFill>
+                  <a:schemeClr val="tx1"/>
+                </a:solidFill>
+              </a:rPr>
+              <a:t> 17</a:t>
+            </a:r>
+            <a:endParaRPr lang="ru-RU" dirty="0">
+              <a:solidFill>
+                <a:schemeClr val="tx1"/>
+              </a:solidFill>
+            </a:endParaRPr>
+          </a:p>
+        </p:txBody>
+      </p:sp>
+      <p:sp>
+        <p:nvSpPr>
+          <p:cNvPr id="34" name="Rectangle 33"/>
+          <p:cNvSpPr/>
           <p:nvPr/>
         </p:nvSpPr>
         <p:spPr>
           <a:xfrm>
-            <a:off x="967508" y="1833602"/>
-            <a:ext cx="272472" cy="369332"/>
+            <a:off x="5915882" y="2293605"/>
+            <a:ext cx="1221513" cy="447153"/>
           </a:xfrm>
           <a:prstGeom prst="rect">
             <a:avLst/>
           </a:prstGeom>
           <a:noFill/>
-        </p:spPr>
-        <p:txBody>
-          <a:bodyPr wrap="square" rtlCol="0">
-            <a:spAutoFit/>
-          </a:bodyPr>
-          <a:lstStyle/>
-          <a:p>
-            <a:r>
-              <a:rPr lang="en-US" dirty="0"/>
-              <a:t>1</a:t>
-            </a:r>
-            <a:endParaRPr lang="ru-RU" dirty="0"/>
-          </a:p>
-        </p:txBody>
-      </p:sp>
-      <p:sp>
-        <p:nvSpPr>
-          <p:cNvPr id="25" name="TextBox 24"/>
+          <a:ln w="25400">
+            <a:solidFill>
+              <a:schemeClr val="tx1"/>
+            </a:solidFill>
+          </a:ln>
+        </p:spPr>
+        <p:style>
+          <a:lnRef idx="2">
+            <a:schemeClr val="accent1">
+              <a:shade val="50000"/>
+            </a:schemeClr>
+          </a:lnRef>
+          <a:fillRef idx="1">
+            <a:schemeClr val="accent1"/>
+          </a:fillRef>
+          <a:effectRef idx="0">
+            <a:schemeClr val="accent1"/>
+          </a:effectRef>
+          <a:fontRef idx="minor">
+            <a:schemeClr val="lt1"/>
+          </a:fontRef>
+        </p:style>
+        <p:txBody>
+          <a:bodyPr rtlCol="0" anchor="ctr"/>
+          <a:lstStyle/>
+          <a:p>
+            <a:pPr algn="ctr"/>
+            <a:r>
+              <a:rPr lang="en-US" dirty="0" smtClean="0">
+                <a:solidFill>
+                  <a:schemeClr val="tx1"/>
+                </a:solidFill>
+              </a:rPr>
+              <a:t>16 -</a:t>
+            </a:r>
+            <a:r>
+              <a:rPr lang="ru-RU" dirty="0" smtClean="0">
+                <a:solidFill>
+                  <a:schemeClr val="tx1"/>
+                </a:solidFill>
+              </a:rPr>
+              <a:t>-</a:t>
+            </a:r>
+            <a:r>
+              <a:rPr lang="en-US" dirty="0" smtClean="0">
+                <a:solidFill>
+                  <a:schemeClr val="tx1"/>
+                </a:solidFill>
+              </a:rPr>
+              <a:t> 13</a:t>
+            </a:r>
+            <a:endParaRPr lang="ru-RU" dirty="0">
+              <a:solidFill>
+                <a:schemeClr val="tx1"/>
+              </a:solidFill>
+            </a:endParaRPr>
+          </a:p>
+        </p:txBody>
+      </p:sp>
+      <p:sp>
+        <p:nvSpPr>
+          <p:cNvPr id="35" name="TextBox 34"/>
           <p:cNvSpPr txBox="1"/>
           <p:nvPr/>
         </p:nvSpPr>
         <p:spPr>
           <a:xfrm>
-            <a:off x="1600199" y="1822550"/>
+            <a:off x="3904677" y="1822550"/>
             <a:ext cx="272472" cy="369332"/>
           </a:xfrm>
           <a:prstGeom prst="rect">
@@ -5360,8 +5557,8 @@
           <a:lstStyle/>
           <a:p>
             <a:r>
-              <a:rPr lang="en-US" dirty="0" smtClean="0"/>
-              <a:t>2</a:t>
+              <a:rPr lang="en-US" dirty="0"/>
+              <a:t>4</a:t>
             </a:r>
             <a:endParaRPr lang="ru-RU" dirty="0"/>
           </a:p>
@@ -5369,13 +5566,13 @@
       </p:sp>
       <p:sp>
         <p:nvSpPr>
-          <p:cNvPr id="26" name="TextBox 25"/>
+          <p:cNvPr id="36" name="TextBox 35"/>
           <p:cNvSpPr txBox="1"/>
           <p:nvPr/>
         </p:nvSpPr>
         <p:spPr>
           <a:xfrm>
-            <a:off x="2660082" y="1806409"/>
+            <a:off x="5149272" y="1822550"/>
             <a:ext cx="272472" cy="369332"/>
           </a:xfrm>
           <a:prstGeom prst="rect">
@@ -5399,14 +5596,448 @@
       </p:sp>
       <p:sp>
         <p:nvSpPr>
-          <p:cNvPr id="27" name="Left Brace 26"/>
+          <p:cNvPr id="37" name="TextBox 36"/>
+          <p:cNvSpPr txBox="1"/>
+          <p:nvPr/>
+        </p:nvSpPr>
+        <p:spPr>
+          <a:xfrm>
+            <a:off x="6331527" y="1822550"/>
+            <a:ext cx="272472" cy="369332"/>
+          </a:xfrm>
+          <a:prstGeom prst="rect">
+            <a:avLst/>
+          </a:prstGeom>
+          <a:noFill/>
+        </p:spPr>
+        <p:txBody>
+          <a:bodyPr wrap="square" rtlCol="0">
+            <a:spAutoFit/>
+          </a:bodyPr>
+          <a:lstStyle/>
+          <a:p>
+            <a:r>
+              <a:rPr lang="en-US" dirty="0"/>
+              <a:t>4</a:t>
+            </a:r>
+            <a:endParaRPr lang="ru-RU" dirty="0"/>
+          </a:p>
+        </p:txBody>
+      </p:sp>
+      <p:sp>
+        <p:nvSpPr>
+          <p:cNvPr id="38" name="Rectangle 37"/>
           <p:cNvSpPr/>
           <p:nvPr/>
         </p:nvSpPr>
         <p:spPr>
           <a:xfrm>
-            <a:off x="2279068" y="1938005"/>
-            <a:ext cx="207824" cy="1985179"/>
+            <a:off x="7137395" y="2289797"/>
+            <a:ext cx="2473031" cy="454203"/>
+          </a:xfrm>
+          <a:prstGeom prst="rect">
+            <a:avLst/>
+          </a:prstGeom>
+          <a:noFill/>
+          <a:ln w="25400">
+            <a:solidFill>
+              <a:schemeClr val="tx1"/>
+            </a:solidFill>
+          </a:ln>
+        </p:spPr>
+        <p:style>
+          <a:lnRef idx="2">
+            <a:schemeClr val="accent1">
+              <a:shade val="50000"/>
+            </a:schemeClr>
+          </a:lnRef>
+          <a:fillRef idx="1">
+            <a:schemeClr val="accent1"/>
+          </a:fillRef>
+          <a:effectRef idx="0">
+            <a:schemeClr val="accent1"/>
+          </a:effectRef>
+          <a:fontRef idx="minor">
+            <a:schemeClr val="lt1"/>
+          </a:fontRef>
+        </p:style>
+        <p:txBody>
+          <a:bodyPr rtlCol="0" anchor="ctr"/>
+          <a:lstStyle/>
+          <a:p>
+            <a:pPr algn="ctr"/>
+            <a:r>
+              <a:rPr lang="en-US" dirty="0" smtClean="0">
+                <a:solidFill>
+                  <a:schemeClr val="tx1"/>
+                </a:solidFill>
+              </a:rPr>
+              <a:t>12 -</a:t>
+            </a:r>
+            <a:r>
+              <a:rPr lang="ru-RU" dirty="0" smtClean="0">
+                <a:solidFill>
+                  <a:schemeClr val="tx1"/>
+                </a:solidFill>
+              </a:rPr>
+              <a:t>-</a:t>
+            </a:r>
+            <a:r>
+              <a:rPr lang="en-US" dirty="0" smtClean="0">
+                <a:solidFill>
+                  <a:schemeClr val="tx1"/>
+                </a:solidFill>
+              </a:rPr>
+              <a:t> 5</a:t>
+            </a:r>
+            <a:endParaRPr lang="ru-RU" dirty="0">
+              <a:solidFill>
+                <a:schemeClr val="tx1"/>
+              </a:solidFill>
+            </a:endParaRPr>
+          </a:p>
+        </p:txBody>
+      </p:sp>
+      <p:sp>
+        <p:nvSpPr>
+          <p:cNvPr id="39" name="TextBox 38"/>
+          <p:cNvSpPr txBox="1"/>
+          <p:nvPr/>
+        </p:nvSpPr>
+        <p:spPr>
+          <a:xfrm>
+            <a:off x="8201892" y="1806409"/>
+            <a:ext cx="272472" cy="369332"/>
+          </a:xfrm>
+          <a:prstGeom prst="rect">
+            <a:avLst/>
+          </a:prstGeom>
+          <a:noFill/>
+        </p:spPr>
+        <p:txBody>
+          <a:bodyPr wrap="square" rtlCol="0">
+            <a:spAutoFit/>
+          </a:bodyPr>
+          <a:lstStyle/>
+          <a:p>
+            <a:r>
+              <a:rPr lang="en-US" dirty="0" smtClean="0"/>
+              <a:t>8</a:t>
+            </a:r>
+            <a:endParaRPr lang="ru-RU" dirty="0"/>
+          </a:p>
+        </p:txBody>
+      </p:sp>
+      <p:sp>
+        <p:nvSpPr>
+          <p:cNvPr id="40" name="Rectangle 39"/>
+          <p:cNvSpPr/>
+          <p:nvPr/>
+        </p:nvSpPr>
+        <p:spPr>
+          <a:xfrm>
+            <a:off x="9610426" y="2293605"/>
+            <a:ext cx="1436265" cy="447153"/>
+          </a:xfrm>
+          <a:prstGeom prst="rect">
+            <a:avLst/>
+          </a:prstGeom>
+          <a:noFill/>
+          <a:ln w="25400">
+            <a:solidFill>
+              <a:schemeClr val="tx1"/>
+            </a:solidFill>
+          </a:ln>
+        </p:spPr>
+        <p:style>
+          <a:lnRef idx="2">
+            <a:schemeClr val="accent1">
+              <a:shade val="50000"/>
+            </a:schemeClr>
+          </a:lnRef>
+          <a:fillRef idx="1">
+            <a:schemeClr val="accent1"/>
+          </a:fillRef>
+          <a:effectRef idx="0">
+            <a:schemeClr val="accent1"/>
+          </a:effectRef>
+          <a:fontRef idx="minor">
+            <a:schemeClr val="lt1"/>
+          </a:fontRef>
+        </p:style>
+        <p:txBody>
+          <a:bodyPr rtlCol="0" anchor="ctr"/>
+          <a:lstStyle/>
+          <a:p>
+            <a:pPr algn="ctr"/>
+            <a:r>
+              <a:rPr lang="en-US" dirty="0">
+                <a:solidFill>
+                  <a:schemeClr val="tx1"/>
+                </a:solidFill>
+              </a:rPr>
+              <a:t>4</a:t>
+            </a:r>
+            <a:r>
+              <a:rPr lang="ru-RU" dirty="0" smtClean="0">
+                <a:solidFill>
+                  <a:schemeClr val="tx1"/>
+                </a:solidFill>
+              </a:rPr>
+              <a:t>-</a:t>
+            </a:r>
+            <a:r>
+              <a:rPr lang="en-US" dirty="0">
+                <a:solidFill>
+                  <a:schemeClr val="tx1"/>
+                </a:solidFill>
+              </a:rPr>
+              <a:t>0</a:t>
+            </a:r>
+            <a:endParaRPr lang="ru-RU" dirty="0">
+              <a:solidFill>
+                <a:schemeClr val="tx1"/>
+              </a:solidFill>
+            </a:endParaRPr>
+          </a:p>
+        </p:txBody>
+      </p:sp>
+      <p:sp>
+        <p:nvSpPr>
+          <p:cNvPr id="41" name="TextBox 40"/>
+          <p:cNvSpPr txBox="1"/>
+          <p:nvPr/>
+        </p:nvSpPr>
+        <p:spPr>
+          <a:xfrm>
+            <a:off x="10192322" y="1820869"/>
+            <a:ext cx="272472" cy="369332"/>
+          </a:xfrm>
+          <a:prstGeom prst="rect">
+            <a:avLst/>
+          </a:prstGeom>
+          <a:noFill/>
+        </p:spPr>
+        <p:txBody>
+          <a:bodyPr wrap="square" rtlCol="0">
+            <a:spAutoFit/>
+          </a:bodyPr>
+          <a:lstStyle/>
+          <a:p>
+            <a:r>
+              <a:rPr lang="en-US" dirty="0"/>
+              <a:t>4</a:t>
+            </a:r>
+            <a:endParaRPr lang="ru-RU" dirty="0"/>
+          </a:p>
+        </p:txBody>
+      </p:sp>
+      <p:sp>
+        <p:nvSpPr>
+          <p:cNvPr id="42" name="TextBox 41"/>
+          <p:cNvSpPr txBox="1"/>
+          <p:nvPr/>
+        </p:nvSpPr>
+        <p:spPr>
+          <a:xfrm>
+            <a:off x="3904677" y="2930594"/>
+            <a:ext cx="7142014" cy="369332"/>
+          </a:xfrm>
+          <a:prstGeom prst="rect">
+            <a:avLst/>
+          </a:prstGeom>
+          <a:noFill/>
+        </p:spPr>
+        <p:txBody>
+          <a:bodyPr wrap="square" rtlCol="0">
+            <a:spAutoFit/>
+          </a:bodyPr>
+          <a:lstStyle/>
+          <a:p>
+            <a:r>
+              <a:rPr lang="en-US" dirty="0" smtClean="0"/>
+              <a:t>R0                 R1                 R2                    mem offset [0-255]         </a:t>
+            </a:r>
+            <a:r>
+              <a:rPr lang="en-US" dirty="0" err="1" smtClean="0"/>
+              <a:t>cond</a:t>
+            </a:r>
+            <a:r>
+              <a:rPr lang="en-US" dirty="0" smtClean="0"/>
+              <a:t> flags</a:t>
+            </a:r>
+            <a:endParaRPr lang="ru-RU" dirty="0"/>
+          </a:p>
+        </p:txBody>
+      </p:sp>
+      <p:sp>
+        <p:nvSpPr>
+          <p:cNvPr id="3" name="TextBox 2"/>
+          <p:cNvSpPr txBox="1"/>
+          <p:nvPr/>
+        </p:nvSpPr>
+        <p:spPr>
+          <a:xfrm>
+            <a:off x="791117" y="5247810"/>
+            <a:ext cx="10509929" cy="1477328"/>
+          </a:xfrm>
+          <a:prstGeom prst="rect">
+            <a:avLst/>
+          </a:prstGeom>
+          <a:noFill/>
+        </p:spPr>
+        <p:txBody>
+          <a:bodyPr wrap="square" rtlCol="0">
+            <a:spAutoFit/>
+          </a:bodyPr>
+          <a:lstStyle/>
+          <a:p>
+            <a:r>
+              <a:rPr lang="pt-BR" dirty="0">
+                <a:latin typeface="Courier New" panose="02070309020205020404" pitchFamily="49" charset="0"/>
+                <a:cs typeface="Courier New" panose="02070309020205020404" pitchFamily="49" charset="0"/>
+              </a:rPr>
+              <a:t>r, 0, m, sw,  R0, R3, R2, 255 </a:t>
+            </a:r>
+            <a:r>
+              <a:rPr lang="pt-BR" dirty="0" smtClean="0">
+                <a:latin typeface="Courier New" panose="02070309020205020404" pitchFamily="49" charset="0"/>
+                <a:cs typeface="Courier New" panose="02070309020205020404" pitchFamily="49" charset="0"/>
+              </a:rPr>
+              <a:t>// mem(r2+255) := r3 </a:t>
+            </a:r>
+            <a:endParaRPr lang="pt-BR" dirty="0">
+              <a:latin typeface="Courier New" panose="02070309020205020404" pitchFamily="49" charset="0"/>
+              <a:cs typeface="Courier New" panose="02070309020205020404" pitchFamily="49" charset="0"/>
+            </a:endParaRPr>
+          </a:p>
+          <a:p>
+            <a:r>
+              <a:rPr lang="pt-BR" dirty="0">
+                <a:latin typeface="Courier New" panose="02070309020205020404" pitchFamily="49" charset="0"/>
+                <a:cs typeface="Courier New" panose="02070309020205020404" pitchFamily="49" charset="0"/>
+              </a:rPr>
+              <a:t>r, 1, m, lw,  </a:t>
+            </a:r>
+            <a:r>
+              <a:rPr lang="pt-BR" dirty="0" smtClean="0">
+                <a:latin typeface="Courier New" panose="02070309020205020404" pitchFamily="49" charset="0"/>
+                <a:cs typeface="Courier New" panose="02070309020205020404" pitchFamily="49" charset="0"/>
+              </a:rPr>
+              <a:t>R0</a:t>
+            </a:r>
+            <a:r>
+              <a:rPr lang="pt-BR" dirty="0">
+                <a:latin typeface="Courier New" panose="02070309020205020404" pitchFamily="49" charset="0"/>
+                <a:cs typeface="Courier New" panose="02070309020205020404" pitchFamily="49" charset="0"/>
+              </a:rPr>
+              <a:t>, R0, R2, 255 </a:t>
+            </a:r>
+            <a:r>
+              <a:rPr lang="pt-BR" dirty="0" smtClean="0">
+                <a:latin typeface="Courier New" panose="02070309020205020404" pitchFamily="49" charset="0"/>
+                <a:cs typeface="Courier New" panose="02070309020205020404" pitchFamily="49" charset="0"/>
+              </a:rPr>
+              <a:t>// r0 := mem(r2+255)</a:t>
+            </a:r>
+          </a:p>
+          <a:p>
+            <a:r>
+              <a:rPr lang="pt-BR" dirty="0">
+                <a:latin typeface="Courier New" panose="02070309020205020404" pitchFamily="49" charset="0"/>
+                <a:cs typeface="Courier New" panose="02070309020205020404" pitchFamily="49" charset="0"/>
+              </a:rPr>
+              <a:t> </a:t>
+            </a:r>
+            <a:r>
+              <a:rPr lang="pt-BR" dirty="0" smtClean="0">
+                <a:latin typeface="Courier New" panose="02070309020205020404" pitchFamily="49" charset="0"/>
+                <a:cs typeface="Courier New" panose="02070309020205020404" pitchFamily="49" charset="0"/>
+              </a:rPr>
+              <a:t>                             //</a:t>
+            </a:r>
+          </a:p>
+          <a:p>
+            <a:r>
+              <a:rPr lang="pt-BR" dirty="0">
+                <a:latin typeface="Courier New" panose="02070309020205020404" pitchFamily="49" charset="0"/>
+                <a:cs typeface="Courier New" panose="02070309020205020404" pitchFamily="49" charset="0"/>
+              </a:rPr>
+              <a:t>i, 0, m, sw,  R0, R3, R2, 255 </a:t>
+            </a:r>
+            <a:r>
+              <a:rPr lang="pt-BR" dirty="0" smtClean="0">
+                <a:latin typeface="Courier New" panose="02070309020205020404" pitchFamily="49" charset="0"/>
+                <a:cs typeface="Courier New" panose="02070309020205020404" pitchFamily="49" charset="0"/>
+              </a:rPr>
+              <a:t>// mem(r2+1024) </a:t>
+            </a:r>
+            <a:r>
+              <a:rPr lang="pt-BR" dirty="0">
+                <a:latin typeface="Courier New" panose="02070309020205020404" pitchFamily="49" charset="0"/>
+                <a:cs typeface="Courier New" panose="02070309020205020404" pitchFamily="49" charset="0"/>
+              </a:rPr>
+              <a:t>:= </a:t>
+            </a:r>
+            <a:r>
+              <a:rPr lang="pt-BR" dirty="0" smtClean="0">
+                <a:latin typeface="Courier New" panose="02070309020205020404" pitchFamily="49" charset="0"/>
+                <a:cs typeface="Courier New" panose="02070309020205020404" pitchFamily="49" charset="0"/>
+              </a:rPr>
+              <a:t>r3   </a:t>
+            </a:r>
+            <a:r>
+              <a:rPr lang="pt-BR" dirty="0" smtClean="0">
+                <a:latin typeface="Courier New" panose="02070309020205020404" pitchFamily="49" charset="0"/>
+                <a:cs typeface="Courier New" panose="02070309020205020404" pitchFamily="49" charset="0"/>
+                <a:sym typeface="Wingdings" panose="05000000000000000000" pitchFamily="2" charset="2"/>
+              </a:rPr>
+              <a:t></a:t>
+            </a:r>
+            <a:r>
+              <a:rPr lang="pt-BR" dirty="0" smtClean="0">
+                <a:latin typeface="Courier New" panose="02070309020205020404" pitchFamily="49" charset="0"/>
+                <a:cs typeface="Courier New" panose="02070309020205020404" pitchFamily="49" charset="0"/>
+              </a:rPr>
+              <a:t> ‘255’ is ignored </a:t>
+            </a:r>
+            <a:endParaRPr lang="pt-BR" dirty="0">
+              <a:latin typeface="Courier New" panose="02070309020205020404" pitchFamily="49" charset="0"/>
+              <a:cs typeface="Courier New" panose="02070309020205020404" pitchFamily="49" charset="0"/>
+            </a:endParaRPr>
+          </a:p>
+          <a:p>
+            <a:r>
+              <a:rPr lang="pt-BR" dirty="0">
+                <a:latin typeface="Courier New" panose="02070309020205020404" pitchFamily="49" charset="0"/>
+                <a:cs typeface="Courier New" panose="02070309020205020404" pitchFamily="49" charset="0"/>
+              </a:rPr>
+              <a:t>di, </a:t>
+            </a:r>
+            <a:r>
+              <a:rPr lang="pt-BR" dirty="0" smtClean="0">
+                <a:latin typeface="Courier New" panose="02070309020205020404" pitchFamily="49" charset="0"/>
+                <a:cs typeface="Courier New" panose="02070309020205020404" pitchFamily="49" charset="0"/>
+              </a:rPr>
+              <a:t>1024</a:t>
+            </a:r>
+            <a:endParaRPr lang="pt-BR" dirty="0">
+              <a:latin typeface="Courier New" panose="02070309020205020404" pitchFamily="49" charset="0"/>
+              <a:cs typeface="Courier New" panose="02070309020205020404" pitchFamily="49" charset="0"/>
+            </a:endParaRPr>
+          </a:p>
+        </p:txBody>
+      </p:sp>
+      <p:sp>
+        <p:nvSpPr>
+          <p:cNvPr id="43" name="Left Brace 42"/>
+          <p:cNvSpPr/>
+          <p:nvPr/>
+        </p:nvSpPr>
+        <p:spPr>
+          <a:xfrm>
+            <a:off x="2114247" y="1686588"/>
+            <a:ext cx="221189" cy="2488012"/>
           </a:xfrm>
           <a:prstGeom prst="leftBrace">
             <a:avLst/>
@@ -5442,49 +6073,16 @@
           </a:p>
         </p:txBody>
       </p:sp>
-      <p:cxnSp>
-        <p:nvCxnSpPr>
-          <p:cNvPr id="29" name="Straight Arrow Connector 28"/>
-          <p:cNvCxnSpPr/>
-          <p:nvPr/>
-        </p:nvCxnSpPr>
-        <p:spPr>
-          <a:xfrm flipH="1">
-            <a:off x="2355272" y="3098800"/>
-            <a:ext cx="2309" cy="1630218"/>
-          </a:xfrm>
-          <a:prstGeom prst="straightConnector1">
-            <a:avLst/>
-          </a:prstGeom>
-          <a:ln>
-            <a:tailEnd type="triangle"/>
-          </a:ln>
-        </p:spPr>
-        <p:style>
-          <a:lnRef idx="1">
-            <a:schemeClr val="accent1"/>
-          </a:lnRef>
-          <a:fillRef idx="0">
-            <a:schemeClr val="accent1"/>
-          </a:fillRef>
-          <a:effectRef idx="0">
-            <a:schemeClr val="accent1"/>
-          </a:effectRef>
-          <a:fontRef idx="minor">
-            <a:schemeClr val="tx1"/>
-          </a:fontRef>
-        </p:style>
-      </p:cxnSp>
-      <p:sp>
-        <p:nvSpPr>
-          <p:cNvPr id="31" name="TextBox 30"/>
+      <p:sp>
+        <p:nvSpPr>
+          <p:cNvPr id="44" name="TextBox 43"/>
           <p:cNvSpPr txBox="1"/>
           <p:nvPr/>
         </p:nvSpPr>
         <p:spPr>
           <a:xfrm>
-            <a:off x="2244434" y="4745304"/>
-            <a:ext cx="6082148" cy="369332"/>
+            <a:off x="1364826" y="1833602"/>
+            <a:ext cx="272472" cy="369332"/>
           </a:xfrm>
           <a:prstGeom prst="rect">
             <a:avLst/>
@@ -5498,754 +6096,10 @@
           <a:lstStyle/>
           <a:p>
             <a:r>
-              <a:rPr lang="en-US" dirty="0" smtClean="0">
-                <a:latin typeface="Times New Roman" panose="02020603050405020304" pitchFamily="18" charset="0"/>
-                <a:cs typeface="Times New Roman" panose="02020603050405020304" pitchFamily="18" charset="0"/>
-              </a:rPr>
-              <a:t>Full op code (2 bit for </a:t>
-            </a:r>
-            <a:r>
-              <a:rPr lang="en-US" dirty="0" err="1" smtClean="0">
-                <a:latin typeface="Times New Roman" panose="02020603050405020304" pitchFamily="18" charset="0"/>
-                <a:cs typeface="Times New Roman" panose="02020603050405020304" pitchFamily="18" charset="0"/>
-              </a:rPr>
-              <a:t>cmd</a:t>
-            </a:r>
-            <a:r>
-              <a:rPr lang="en-US" dirty="0" smtClean="0">
-                <a:latin typeface="Times New Roman" panose="02020603050405020304" pitchFamily="18" charset="0"/>
-                <a:cs typeface="Times New Roman" panose="02020603050405020304" pitchFamily="18" charset="0"/>
-              </a:rPr>
-              <a:t> class and 4 for real op code)</a:t>
-            </a:r>
-            <a:endParaRPr lang="ru-RU" dirty="0">
-              <a:latin typeface="Times New Roman" panose="02020603050405020304" pitchFamily="18" charset="0"/>
-              <a:cs typeface="Times New Roman" panose="02020603050405020304" pitchFamily="18" charset="0"/>
-            </a:endParaRPr>
-          </a:p>
-        </p:txBody>
-      </p:sp>
-      <p:sp>
-        <p:nvSpPr>
-          <p:cNvPr id="32" name="Rectangle 31"/>
-          <p:cNvSpPr/>
-          <p:nvPr/>
-        </p:nvSpPr>
-        <p:spPr>
-          <a:xfrm>
-            <a:off x="3445162" y="2290618"/>
-            <a:ext cx="1221513" cy="450140"/>
-          </a:xfrm>
-          <a:prstGeom prst="rect">
-            <a:avLst/>
-          </a:prstGeom>
-          <a:noFill/>
-          <a:ln w="25400">
-            <a:solidFill>
-              <a:schemeClr val="tx1"/>
-            </a:solidFill>
-          </a:ln>
-        </p:spPr>
-        <p:style>
-          <a:lnRef idx="2">
-            <a:schemeClr val="accent1">
-              <a:shade val="50000"/>
-            </a:schemeClr>
-          </a:lnRef>
-          <a:fillRef idx="1">
-            <a:schemeClr val="accent1"/>
-          </a:fillRef>
-          <a:effectRef idx="0">
-            <a:schemeClr val="accent1"/>
-          </a:effectRef>
-          <a:fontRef idx="minor">
-            <a:schemeClr val="lt1"/>
-          </a:fontRef>
-        </p:style>
-        <p:txBody>
-          <a:bodyPr rtlCol="0" anchor="ctr"/>
-          <a:lstStyle/>
-          <a:p>
-            <a:pPr algn="ctr"/>
-            <a:r>
-              <a:rPr lang="ru-RU" dirty="0" smtClean="0">
-                <a:solidFill>
-                  <a:schemeClr val="tx1"/>
-                </a:solidFill>
-              </a:rPr>
-              <a:t>2</a:t>
-            </a:r>
-            <a:r>
-              <a:rPr lang="en-US" dirty="0">
-                <a:solidFill>
-                  <a:schemeClr val="tx1"/>
-                </a:solidFill>
-              </a:rPr>
+              <a:rPr lang="en-US" dirty="0"/>
               <a:t>3</a:t>
             </a:r>
-            <a:r>
-              <a:rPr lang="ru-RU" dirty="0" smtClean="0">
-                <a:solidFill>
-                  <a:schemeClr val="tx1"/>
-                </a:solidFill>
-              </a:rPr>
-              <a:t>-2</a:t>
-            </a:r>
-            <a:r>
-              <a:rPr lang="en-US" dirty="0">
-                <a:solidFill>
-                  <a:schemeClr val="tx1"/>
-                </a:solidFill>
-              </a:rPr>
-              <a:t>0</a:t>
-            </a:r>
-            <a:endParaRPr lang="ru-RU" dirty="0">
-              <a:solidFill>
-                <a:schemeClr val="tx1"/>
-              </a:solidFill>
-            </a:endParaRPr>
-          </a:p>
-        </p:txBody>
-      </p:sp>
-      <p:sp>
-        <p:nvSpPr>
-          <p:cNvPr id="33" name="Rectangle 32"/>
-          <p:cNvSpPr/>
-          <p:nvPr/>
-        </p:nvSpPr>
-        <p:spPr>
-          <a:xfrm>
-            <a:off x="4666675" y="2286555"/>
-            <a:ext cx="1249207" cy="454203"/>
-          </a:xfrm>
-          <a:prstGeom prst="rect">
-            <a:avLst/>
-          </a:prstGeom>
-          <a:noFill/>
-          <a:ln w="25400">
-            <a:solidFill>
-              <a:schemeClr val="tx1"/>
-            </a:solidFill>
-          </a:ln>
-        </p:spPr>
-        <p:style>
-          <a:lnRef idx="2">
-            <a:schemeClr val="accent1">
-              <a:shade val="50000"/>
-            </a:schemeClr>
-          </a:lnRef>
-          <a:fillRef idx="1">
-            <a:schemeClr val="accent1"/>
-          </a:fillRef>
-          <a:effectRef idx="0">
-            <a:schemeClr val="accent1"/>
-          </a:effectRef>
-          <a:fontRef idx="minor">
-            <a:schemeClr val="lt1"/>
-          </a:fontRef>
-        </p:style>
-        <p:txBody>
-          <a:bodyPr rtlCol="0" anchor="ctr"/>
-          <a:lstStyle/>
-          <a:p>
-            <a:pPr algn="ctr"/>
-            <a:r>
-              <a:rPr lang="en-US" dirty="0" smtClean="0">
-                <a:solidFill>
-                  <a:schemeClr val="tx1"/>
-                </a:solidFill>
-              </a:rPr>
-              <a:t>19</a:t>
-            </a:r>
-            <a:r>
-              <a:rPr lang="ru-RU" dirty="0" smtClean="0">
-                <a:solidFill>
-                  <a:schemeClr val="tx1"/>
-                </a:solidFill>
-              </a:rPr>
-              <a:t>-</a:t>
-            </a:r>
-            <a:r>
-              <a:rPr lang="en-US" dirty="0" smtClean="0">
-                <a:solidFill>
-                  <a:schemeClr val="tx1"/>
-                </a:solidFill>
-              </a:rPr>
-              <a:t>17</a:t>
-            </a:r>
-            <a:endParaRPr lang="ru-RU" dirty="0">
-              <a:solidFill>
-                <a:schemeClr val="tx1"/>
-              </a:solidFill>
-            </a:endParaRPr>
-          </a:p>
-        </p:txBody>
-      </p:sp>
-      <p:sp>
-        <p:nvSpPr>
-          <p:cNvPr id="34" name="Rectangle 33"/>
-          <p:cNvSpPr/>
-          <p:nvPr/>
-        </p:nvSpPr>
-        <p:spPr>
-          <a:xfrm>
-            <a:off x="5915882" y="2293605"/>
-            <a:ext cx="1221513" cy="447153"/>
-          </a:xfrm>
-          <a:prstGeom prst="rect">
-            <a:avLst/>
-          </a:prstGeom>
-          <a:noFill/>
-          <a:ln w="25400">
-            <a:solidFill>
-              <a:schemeClr val="tx1"/>
-            </a:solidFill>
-          </a:ln>
-        </p:spPr>
-        <p:style>
-          <a:lnRef idx="2">
-            <a:schemeClr val="accent1">
-              <a:shade val="50000"/>
-            </a:schemeClr>
-          </a:lnRef>
-          <a:fillRef idx="1">
-            <a:schemeClr val="accent1"/>
-          </a:fillRef>
-          <a:effectRef idx="0">
-            <a:schemeClr val="accent1"/>
-          </a:effectRef>
-          <a:fontRef idx="minor">
-            <a:schemeClr val="lt1"/>
-          </a:fontRef>
-        </p:style>
-        <p:txBody>
-          <a:bodyPr rtlCol="0" anchor="ctr"/>
-          <a:lstStyle/>
-          <a:p>
-            <a:pPr algn="ctr"/>
-            <a:r>
-              <a:rPr lang="en-US" dirty="0" smtClean="0">
-                <a:solidFill>
-                  <a:schemeClr val="tx1"/>
-                </a:solidFill>
-              </a:rPr>
-              <a:t>16</a:t>
-            </a:r>
-            <a:r>
-              <a:rPr lang="ru-RU" dirty="0" smtClean="0">
-                <a:solidFill>
-                  <a:schemeClr val="tx1"/>
-                </a:solidFill>
-              </a:rPr>
-              <a:t>-</a:t>
-            </a:r>
-            <a:r>
-              <a:rPr lang="en-US" dirty="0" smtClean="0">
-                <a:solidFill>
-                  <a:schemeClr val="tx1"/>
-                </a:solidFill>
-              </a:rPr>
-              <a:t>13</a:t>
-            </a:r>
-            <a:endParaRPr lang="ru-RU" dirty="0">
-              <a:solidFill>
-                <a:schemeClr val="tx1"/>
-              </a:solidFill>
-            </a:endParaRPr>
-          </a:p>
-        </p:txBody>
-      </p:sp>
-      <p:sp>
-        <p:nvSpPr>
-          <p:cNvPr id="35" name="TextBox 34"/>
-          <p:cNvSpPr txBox="1"/>
-          <p:nvPr/>
-        </p:nvSpPr>
-        <p:spPr>
-          <a:xfrm>
-            <a:off x="3904677" y="1822550"/>
-            <a:ext cx="272472" cy="369332"/>
-          </a:xfrm>
-          <a:prstGeom prst="rect">
-            <a:avLst/>
-          </a:prstGeom>
-          <a:noFill/>
-        </p:spPr>
-        <p:txBody>
-          <a:bodyPr wrap="square" rtlCol="0">
-            <a:spAutoFit/>
-          </a:bodyPr>
-          <a:lstStyle/>
-          <a:p>
-            <a:r>
-              <a:rPr lang="en-US" dirty="0"/>
-              <a:t>4</a:t>
-            </a:r>
             <a:endParaRPr lang="ru-RU" dirty="0"/>
-          </a:p>
-        </p:txBody>
-      </p:sp>
-      <p:sp>
-        <p:nvSpPr>
-          <p:cNvPr id="36" name="TextBox 35"/>
-          <p:cNvSpPr txBox="1"/>
-          <p:nvPr/>
-        </p:nvSpPr>
-        <p:spPr>
-          <a:xfrm>
-            <a:off x="5149272" y="1822550"/>
-            <a:ext cx="272472" cy="369332"/>
-          </a:xfrm>
-          <a:prstGeom prst="rect">
-            <a:avLst/>
-          </a:prstGeom>
-          <a:noFill/>
-        </p:spPr>
-        <p:txBody>
-          <a:bodyPr wrap="square" rtlCol="0">
-            <a:spAutoFit/>
-          </a:bodyPr>
-          <a:lstStyle/>
-          <a:p>
-            <a:r>
-              <a:rPr lang="en-US" dirty="0"/>
-              <a:t>4</a:t>
-            </a:r>
-            <a:endParaRPr lang="ru-RU" dirty="0"/>
-          </a:p>
-        </p:txBody>
-      </p:sp>
-      <p:sp>
-        <p:nvSpPr>
-          <p:cNvPr id="37" name="TextBox 36"/>
-          <p:cNvSpPr txBox="1"/>
-          <p:nvPr/>
-        </p:nvSpPr>
-        <p:spPr>
-          <a:xfrm>
-            <a:off x="6331527" y="1822550"/>
-            <a:ext cx="272472" cy="369332"/>
-          </a:xfrm>
-          <a:prstGeom prst="rect">
-            <a:avLst/>
-          </a:prstGeom>
-          <a:noFill/>
-        </p:spPr>
-        <p:txBody>
-          <a:bodyPr wrap="square" rtlCol="0">
-            <a:spAutoFit/>
-          </a:bodyPr>
-          <a:lstStyle/>
-          <a:p>
-            <a:r>
-              <a:rPr lang="en-US" dirty="0"/>
-              <a:t>4</a:t>
-            </a:r>
-            <a:endParaRPr lang="ru-RU" dirty="0"/>
-          </a:p>
-        </p:txBody>
-      </p:sp>
-      <p:sp>
-        <p:nvSpPr>
-          <p:cNvPr id="38" name="Rectangle 37"/>
-          <p:cNvSpPr/>
-          <p:nvPr/>
-        </p:nvSpPr>
-        <p:spPr>
-          <a:xfrm>
-            <a:off x="7137395" y="2289797"/>
-            <a:ext cx="2473031" cy="454203"/>
-          </a:xfrm>
-          <a:prstGeom prst="rect">
-            <a:avLst/>
-          </a:prstGeom>
-          <a:noFill/>
-          <a:ln w="25400">
-            <a:solidFill>
-              <a:schemeClr val="tx1"/>
-            </a:solidFill>
-          </a:ln>
-        </p:spPr>
-        <p:style>
-          <a:lnRef idx="2">
-            <a:schemeClr val="accent1">
-              <a:shade val="50000"/>
-            </a:schemeClr>
-          </a:lnRef>
-          <a:fillRef idx="1">
-            <a:schemeClr val="accent1"/>
-          </a:fillRef>
-          <a:effectRef idx="0">
-            <a:schemeClr val="accent1"/>
-          </a:effectRef>
-          <a:fontRef idx="minor">
-            <a:schemeClr val="lt1"/>
-          </a:fontRef>
-        </p:style>
-        <p:txBody>
-          <a:bodyPr rtlCol="0" anchor="ctr"/>
-          <a:lstStyle/>
-          <a:p>
-            <a:pPr algn="ctr"/>
-            <a:r>
-              <a:rPr lang="en-US" dirty="0" smtClean="0">
-                <a:solidFill>
-                  <a:schemeClr val="tx1"/>
-                </a:solidFill>
-              </a:rPr>
-              <a:t>12</a:t>
-            </a:r>
-            <a:r>
-              <a:rPr lang="ru-RU" dirty="0" smtClean="0">
-                <a:solidFill>
-                  <a:schemeClr val="tx1"/>
-                </a:solidFill>
-              </a:rPr>
-              <a:t>-</a:t>
-            </a:r>
-            <a:r>
-              <a:rPr lang="en-US" dirty="0" smtClean="0">
-                <a:solidFill>
-                  <a:schemeClr val="tx1"/>
-                </a:solidFill>
-              </a:rPr>
-              <a:t>5</a:t>
-            </a:r>
-            <a:endParaRPr lang="ru-RU" dirty="0">
-              <a:solidFill>
-                <a:schemeClr val="tx1"/>
-              </a:solidFill>
-            </a:endParaRPr>
-          </a:p>
-        </p:txBody>
-      </p:sp>
-      <p:sp>
-        <p:nvSpPr>
-          <p:cNvPr id="39" name="TextBox 38"/>
-          <p:cNvSpPr txBox="1"/>
-          <p:nvPr/>
-        </p:nvSpPr>
-        <p:spPr>
-          <a:xfrm>
-            <a:off x="8201892" y="1806409"/>
-            <a:ext cx="272472" cy="369332"/>
-          </a:xfrm>
-          <a:prstGeom prst="rect">
-            <a:avLst/>
-          </a:prstGeom>
-          <a:noFill/>
-        </p:spPr>
-        <p:txBody>
-          <a:bodyPr wrap="square" rtlCol="0">
-            <a:spAutoFit/>
-          </a:bodyPr>
-          <a:lstStyle/>
-          <a:p>
-            <a:r>
-              <a:rPr lang="en-US" dirty="0" smtClean="0"/>
-              <a:t>8</a:t>
-            </a:r>
-            <a:endParaRPr lang="ru-RU" dirty="0"/>
-          </a:p>
-        </p:txBody>
-      </p:sp>
-      <p:sp>
-        <p:nvSpPr>
-          <p:cNvPr id="40" name="Rectangle 39"/>
-          <p:cNvSpPr/>
-          <p:nvPr/>
-        </p:nvSpPr>
-        <p:spPr>
-          <a:xfrm>
-            <a:off x="9610426" y="2293605"/>
-            <a:ext cx="1436265" cy="447153"/>
-          </a:xfrm>
-          <a:prstGeom prst="rect">
-            <a:avLst/>
-          </a:prstGeom>
-          <a:noFill/>
-          <a:ln w="25400">
-            <a:solidFill>
-              <a:schemeClr val="tx1"/>
-            </a:solidFill>
-          </a:ln>
-        </p:spPr>
-        <p:style>
-          <a:lnRef idx="2">
-            <a:schemeClr val="accent1">
-              <a:shade val="50000"/>
-            </a:schemeClr>
-          </a:lnRef>
-          <a:fillRef idx="1">
-            <a:schemeClr val="accent1"/>
-          </a:fillRef>
-          <a:effectRef idx="0">
-            <a:schemeClr val="accent1"/>
-          </a:effectRef>
-          <a:fontRef idx="minor">
-            <a:schemeClr val="lt1"/>
-          </a:fontRef>
-        </p:style>
-        <p:txBody>
-          <a:bodyPr rtlCol="0" anchor="ctr"/>
-          <a:lstStyle/>
-          <a:p>
-            <a:pPr algn="ctr"/>
-            <a:r>
-              <a:rPr lang="en-US" dirty="0">
-                <a:solidFill>
-                  <a:schemeClr val="tx1"/>
-                </a:solidFill>
-              </a:rPr>
-              <a:t>4</a:t>
-            </a:r>
-            <a:r>
-              <a:rPr lang="ru-RU" dirty="0" smtClean="0">
-                <a:solidFill>
-                  <a:schemeClr val="tx1"/>
-                </a:solidFill>
-              </a:rPr>
-              <a:t>-</a:t>
-            </a:r>
-            <a:r>
-              <a:rPr lang="en-US" dirty="0">
-                <a:solidFill>
-                  <a:schemeClr val="tx1"/>
-                </a:solidFill>
-              </a:rPr>
-              <a:t>0</a:t>
-            </a:r>
-            <a:endParaRPr lang="ru-RU" dirty="0">
-              <a:solidFill>
-                <a:schemeClr val="tx1"/>
-              </a:solidFill>
-            </a:endParaRPr>
-          </a:p>
-        </p:txBody>
-      </p:sp>
-      <p:sp>
-        <p:nvSpPr>
-          <p:cNvPr id="41" name="TextBox 40"/>
-          <p:cNvSpPr txBox="1"/>
-          <p:nvPr/>
-        </p:nvSpPr>
-        <p:spPr>
-          <a:xfrm>
-            <a:off x="10192322" y="1820869"/>
-            <a:ext cx="272472" cy="369332"/>
-          </a:xfrm>
-          <a:prstGeom prst="rect">
-            <a:avLst/>
-          </a:prstGeom>
-          <a:noFill/>
-        </p:spPr>
-        <p:txBody>
-          <a:bodyPr wrap="square" rtlCol="0">
-            <a:spAutoFit/>
-          </a:bodyPr>
-          <a:lstStyle/>
-          <a:p>
-            <a:r>
-              <a:rPr lang="en-US" dirty="0"/>
-              <a:t>4</a:t>
-            </a:r>
-            <a:endParaRPr lang="ru-RU" dirty="0"/>
-          </a:p>
-        </p:txBody>
-      </p:sp>
-      <p:sp>
-        <p:nvSpPr>
-          <p:cNvPr id="42" name="TextBox 41"/>
-          <p:cNvSpPr txBox="1"/>
-          <p:nvPr/>
-        </p:nvSpPr>
-        <p:spPr>
-          <a:xfrm>
-            <a:off x="3904677" y="2930594"/>
-            <a:ext cx="7142014" cy="369332"/>
-          </a:xfrm>
-          <a:prstGeom prst="rect">
-            <a:avLst/>
-          </a:prstGeom>
-          <a:noFill/>
-        </p:spPr>
-        <p:txBody>
-          <a:bodyPr wrap="square" rtlCol="0">
-            <a:spAutoFit/>
-          </a:bodyPr>
-          <a:lstStyle/>
-          <a:p>
-            <a:r>
-              <a:rPr lang="en-US" dirty="0" smtClean="0"/>
-              <a:t>R0                 R1                 R2                    mem offset [0-255]         </a:t>
-            </a:r>
-            <a:r>
-              <a:rPr lang="en-US" dirty="0" err="1" smtClean="0"/>
-              <a:t>cond</a:t>
-            </a:r>
-            <a:r>
-              <a:rPr lang="en-US" dirty="0" smtClean="0"/>
-              <a:t> flags</a:t>
-            </a:r>
-            <a:endParaRPr lang="ru-RU" dirty="0"/>
-          </a:p>
-        </p:txBody>
-      </p:sp>
-      <p:sp>
-        <p:nvSpPr>
-          <p:cNvPr id="3" name="TextBox 2"/>
-          <p:cNvSpPr txBox="1"/>
-          <p:nvPr/>
-        </p:nvSpPr>
-        <p:spPr>
-          <a:xfrm>
-            <a:off x="791117" y="5247810"/>
-            <a:ext cx="10509929" cy="1477328"/>
-          </a:xfrm>
-          <a:prstGeom prst="rect">
-            <a:avLst/>
-          </a:prstGeom>
-          <a:noFill/>
-        </p:spPr>
-        <p:txBody>
-          <a:bodyPr wrap="square" rtlCol="0">
-            <a:spAutoFit/>
-          </a:bodyPr>
-          <a:lstStyle/>
-          <a:p>
-            <a:r>
-              <a:rPr lang="pt-BR" dirty="0">
-                <a:latin typeface="Courier New" panose="02070309020205020404" pitchFamily="49" charset="0"/>
-                <a:cs typeface="Courier New" panose="02070309020205020404" pitchFamily="49" charset="0"/>
-              </a:rPr>
-              <a:t>r, 0, m, sw,  R0, R3, R2, 255 </a:t>
-            </a:r>
-            <a:r>
-              <a:rPr lang="pt-BR" dirty="0" smtClean="0">
-                <a:latin typeface="Courier New" panose="02070309020205020404" pitchFamily="49" charset="0"/>
-                <a:cs typeface="Courier New" panose="02070309020205020404" pitchFamily="49" charset="0"/>
-              </a:rPr>
-              <a:t>// mem(r2+255) := r3 </a:t>
-            </a:r>
-            <a:endParaRPr lang="pt-BR" dirty="0">
-              <a:latin typeface="Courier New" panose="02070309020205020404" pitchFamily="49" charset="0"/>
-              <a:cs typeface="Courier New" panose="02070309020205020404" pitchFamily="49" charset="0"/>
-            </a:endParaRPr>
-          </a:p>
-          <a:p>
-            <a:r>
-              <a:rPr lang="pt-BR" dirty="0">
-                <a:latin typeface="Courier New" panose="02070309020205020404" pitchFamily="49" charset="0"/>
-                <a:cs typeface="Courier New" panose="02070309020205020404" pitchFamily="49" charset="0"/>
-              </a:rPr>
-              <a:t>r, 1, m, lw,  </a:t>
-            </a:r>
-            <a:r>
-              <a:rPr lang="pt-BR" dirty="0" smtClean="0">
-                <a:latin typeface="Courier New" panose="02070309020205020404" pitchFamily="49" charset="0"/>
-                <a:cs typeface="Courier New" panose="02070309020205020404" pitchFamily="49" charset="0"/>
-              </a:rPr>
-              <a:t>R0</a:t>
-            </a:r>
-            <a:r>
-              <a:rPr lang="pt-BR" dirty="0">
-                <a:latin typeface="Courier New" panose="02070309020205020404" pitchFamily="49" charset="0"/>
-                <a:cs typeface="Courier New" panose="02070309020205020404" pitchFamily="49" charset="0"/>
-              </a:rPr>
-              <a:t>, R0, R2, 255 </a:t>
-            </a:r>
-            <a:r>
-              <a:rPr lang="pt-BR" dirty="0" smtClean="0">
-                <a:latin typeface="Courier New" panose="02070309020205020404" pitchFamily="49" charset="0"/>
-                <a:cs typeface="Courier New" panose="02070309020205020404" pitchFamily="49" charset="0"/>
-              </a:rPr>
-              <a:t>// r0 := mem(r2+255)</a:t>
-            </a:r>
-          </a:p>
-          <a:p>
-            <a:r>
-              <a:rPr lang="pt-BR" dirty="0">
-                <a:latin typeface="Courier New" panose="02070309020205020404" pitchFamily="49" charset="0"/>
-                <a:cs typeface="Courier New" panose="02070309020205020404" pitchFamily="49" charset="0"/>
-              </a:rPr>
-              <a:t> </a:t>
-            </a:r>
-            <a:r>
-              <a:rPr lang="pt-BR" dirty="0" smtClean="0">
-                <a:latin typeface="Courier New" panose="02070309020205020404" pitchFamily="49" charset="0"/>
-                <a:cs typeface="Courier New" panose="02070309020205020404" pitchFamily="49" charset="0"/>
-              </a:rPr>
-              <a:t>                             //</a:t>
-            </a:r>
-          </a:p>
-          <a:p>
-            <a:r>
-              <a:rPr lang="pt-BR" dirty="0">
-                <a:latin typeface="Courier New" panose="02070309020205020404" pitchFamily="49" charset="0"/>
-                <a:cs typeface="Courier New" panose="02070309020205020404" pitchFamily="49" charset="0"/>
-              </a:rPr>
-              <a:t>i, 0, m, sw,  R0, R3, R2, 255 </a:t>
-            </a:r>
-            <a:r>
-              <a:rPr lang="pt-BR" dirty="0" smtClean="0">
-                <a:latin typeface="Courier New" panose="02070309020205020404" pitchFamily="49" charset="0"/>
-                <a:cs typeface="Courier New" panose="02070309020205020404" pitchFamily="49" charset="0"/>
-              </a:rPr>
-              <a:t>// mem(r2+1024) </a:t>
-            </a:r>
-            <a:r>
-              <a:rPr lang="pt-BR" dirty="0">
-                <a:latin typeface="Courier New" panose="02070309020205020404" pitchFamily="49" charset="0"/>
-                <a:cs typeface="Courier New" panose="02070309020205020404" pitchFamily="49" charset="0"/>
-              </a:rPr>
-              <a:t>:= </a:t>
-            </a:r>
-            <a:r>
-              <a:rPr lang="pt-BR" dirty="0" smtClean="0">
-                <a:latin typeface="Courier New" panose="02070309020205020404" pitchFamily="49" charset="0"/>
-                <a:cs typeface="Courier New" panose="02070309020205020404" pitchFamily="49" charset="0"/>
-              </a:rPr>
-              <a:t>r3   </a:t>
-            </a:r>
-            <a:r>
-              <a:rPr lang="pt-BR" dirty="0" smtClean="0">
-                <a:latin typeface="Courier New" panose="02070309020205020404" pitchFamily="49" charset="0"/>
-                <a:cs typeface="Courier New" panose="02070309020205020404" pitchFamily="49" charset="0"/>
-                <a:sym typeface="Wingdings" panose="05000000000000000000" pitchFamily="2" charset="2"/>
-              </a:rPr>
-              <a:t></a:t>
-            </a:r>
-            <a:r>
-              <a:rPr lang="pt-BR" dirty="0" smtClean="0">
-                <a:latin typeface="Courier New" panose="02070309020205020404" pitchFamily="49" charset="0"/>
-                <a:cs typeface="Courier New" panose="02070309020205020404" pitchFamily="49" charset="0"/>
-              </a:rPr>
-              <a:t> ‘255’ is ignored </a:t>
-            </a:r>
-            <a:endParaRPr lang="pt-BR" dirty="0">
-              <a:latin typeface="Courier New" panose="02070309020205020404" pitchFamily="49" charset="0"/>
-              <a:cs typeface="Courier New" panose="02070309020205020404" pitchFamily="49" charset="0"/>
-            </a:endParaRPr>
-          </a:p>
-          <a:p>
-            <a:r>
-              <a:rPr lang="pt-BR" dirty="0">
-                <a:latin typeface="Courier New" panose="02070309020205020404" pitchFamily="49" charset="0"/>
-                <a:cs typeface="Courier New" panose="02070309020205020404" pitchFamily="49" charset="0"/>
-              </a:rPr>
-              <a:t>di, </a:t>
-            </a:r>
-            <a:r>
-              <a:rPr lang="pt-BR" dirty="0" smtClean="0">
-                <a:latin typeface="Courier New" panose="02070309020205020404" pitchFamily="49" charset="0"/>
-                <a:cs typeface="Courier New" panose="02070309020205020404" pitchFamily="49" charset="0"/>
-              </a:rPr>
-              <a:t>1024</a:t>
-            </a:r>
-            <a:endParaRPr lang="pt-BR" dirty="0">
-              <a:latin typeface="Courier New" panose="02070309020205020404" pitchFamily="49" charset="0"/>
-              <a:cs typeface="Courier New" panose="02070309020205020404" pitchFamily="49" charset="0"/>
-            </a:endParaRPr>
           </a:p>
         </p:txBody>
       </p:sp>

</xml_diff>

<commit_message>
change S and CF flags order
</commit_message>
<xml_diff>
--- a/DOC/isa_encoding.pptx
+++ b/DOC/isa_encoding.pptx
@@ -4227,7 +4227,7 @@
           <a:p>
             <a:r>
               <a:rPr lang="en-US" dirty="0" smtClean="0"/>
-              <a:t>R0                 R1                 R2                             not used                    </a:t>
+              <a:t>R0                 R1                 R2                                not used                </a:t>
             </a:r>
             <a:r>
               <a:rPr lang="en-US" dirty="0" err="1" smtClean="0"/>
@@ -4398,7 +4398,7 @@
         </p:nvSpPr>
         <p:spPr>
           <a:xfrm>
-            <a:off x="7137304" y="3699644"/>
+            <a:off x="7629236" y="4258996"/>
             <a:ext cx="4320050" cy="369332"/>
           </a:xfrm>
           <a:prstGeom prst="rect">
@@ -4435,7 +4435,7 @@
         <p:spPr>
           <a:xfrm>
             <a:off x="7760759" y="2846987"/>
-            <a:ext cx="12747" cy="1498599"/>
+            <a:ext cx="9561" cy="1373225"/>
           </a:xfrm>
           <a:prstGeom prst="straightConnector1">
             <a:avLst/>
@@ -4467,7 +4467,7 @@
         </p:nvSpPr>
         <p:spPr>
           <a:xfrm>
-            <a:off x="7475684" y="4375972"/>
+            <a:off x="7170643" y="3670460"/>
             <a:ext cx="4616857" cy="369332"/>
           </a:xfrm>
           <a:prstGeom prst="rect">
@@ -4585,18 +4585,25 @@
           <a:lstStyle/>
           <a:p>
             <a:r>
+              <a:rPr lang="pt-BR" dirty="0" smtClean="0">
+                <a:latin typeface="Courier New" panose="02070309020205020404" pitchFamily="49" charset="0"/>
+                <a:cs typeface="Courier New" panose="02070309020205020404" pitchFamily="49" charset="0"/>
+              </a:rPr>
+              <a:t>i, a</a:t>
+            </a:r>
+            <a:r>
               <a:rPr lang="pt-BR" dirty="0">
                 <a:latin typeface="Courier New" panose="02070309020205020404" pitchFamily="49" charset="0"/>
                 <a:cs typeface="Courier New" panose="02070309020205020404" pitchFamily="49" charset="0"/>
               </a:rPr>
-              <a:t>i, 1, a, or,  R2, R0, </a:t>
+              <a:t>, or,  R2, R0, </a:t>
             </a:r>
             <a:r>
               <a:rPr lang="pt-BR" dirty="0" smtClean="0">
                 <a:latin typeface="Courier New" panose="02070309020205020404" pitchFamily="49" charset="0"/>
                 <a:cs typeface="Courier New" panose="02070309020205020404" pitchFamily="49" charset="0"/>
               </a:rPr>
-              <a:t>R0  // r2 := (r0 | 2) </a:t>
+              <a:t>R0  // r2   := (r0 | 2) </a:t>
             </a:r>
             <a:endParaRPr lang="pt-BR" dirty="0">
               <a:latin typeface="Courier New" panose="02070309020205020404" pitchFamily="49" charset="0"/>
@@ -4616,7 +4623,7 @@
                 <a:latin typeface="Courier New" panose="02070309020205020404" pitchFamily="49" charset="0"/>
                 <a:cs typeface="Courier New" panose="02070309020205020404" pitchFamily="49" charset="0"/>
               </a:rPr>
-              <a:t>2                     // data        2</a:t>
+              <a:t>2                  // data that is equal to 2</a:t>
             </a:r>
             <a:endParaRPr lang="pt-BR" dirty="0">
               <a:latin typeface="Courier New" panose="02070309020205020404" pitchFamily="49" charset="0"/>
@@ -4625,18 +4632,25 @@
           </a:p>
           <a:p>
             <a:r>
+              <a:rPr lang="pt-BR" dirty="0" smtClean="0">
+                <a:latin typeface="Courier New" panose="02070309020205020404" pitchFamily="49" charset="0"/>
+                <a:cs typeface="Courier New" panose="02070309020205020404" pitchFamily="49" charset="0"/>
+              </a:rPr>
+              <a:t>r, a</a:t>
+            </a:r>
+            <a:r>
               <a:rPr lang="pt-BR" dirty="0">
                 <a:latin typeface="Courier New" panose="02070309020205020404" pitchFamily="49" charset="0"/>
                 <a:cs typeface="Courier New" panose="02070309020205020404" pitchFamily="49" charset="0"/>
               </a:rPr>
-              <a:t>r, 1, a, add, R0, R1, </a:t>
+              <a:t>, add, R0, R1, </a:t>
             </a:r>
             <a:r>
               <a:rPr lang="pt-BR" dirty="0" smtClean="0">
                 <a:latin typeface="Courier New" panose="02070309020205020404" pitchFamily="49" charset="0"/>
                 <a:cs typeface="Courier New" panose="02070309020205020404" pitchFamily="49" charset="0"/>
               </a:rPr>
-              <a:t>R2  // r0 := r1 + r2</a:t>
+              <a:t>R2  // r0   := r1 + r2</a:t>
             </a:r>
             <a:endParaRPr lang="pt-BR" dirty="0">
               <a:latin typeface="Courier New" panose="02070309020205020404" pitchFamily="49" charset="0"/>
@@ -4995,7 +5009,7 @@
         <p:spPr>
           <a:xfrm>
             <a:off x="535707" y="3454400"/>
-            <a:ext cx="7666184" cy="646331"/>
+            <a:ext cx="6490324" cy="923330"/>
           </a:xfrm>
           <a:prstGeom prst="rect">
             <a:avLst/>
@@ -5032,23 +5046,61 @@
           </a:p>
           <a:p>
             <a:r>
+              <a:rPr lang="en-US" dirty="0" smtClean="0">
+                <a:latin typeface="Times New Roman" panose="02020603050405020304" pitchFamily="18" charset="0"/>
+                <a:cs typeface="Times New Roman" panose="02020603050405020304" pitchFamily="18" charset="0"/>
+              </a:rPr>
+              <a:t>I-type commands </a:t>
+            </a:r>
+            <a:r>
               <a:rPr lang="en-US" dirty="0">
                 <a:latin typeface="Times New Roman" panose="02020603050405020304" pitchFamily="18" charset="0"/>
                 <a:cs typeface="Times New Roman" panose="02020603050405020304" pitchFamily="18" charset="0"/>
               </a:rPr>
-              <a:t>Immediate commands don’t use R2 field</a:t>
+              <a:t>don’t use R2 and ‘</a:t>
+            </a:r>
+            <a:r>
+              <a:rPr lang="en-US" dirty="0"/>
+              <a:t>mem offset</a:t>
+            </a:r>
+            <a:r>
+              <a:rPr lang="en-US" dirty="0">
+                <a:latin typeface="Times New Roman" panose="02020603050405020304" pitchFamily="18" charset="0"/>
+                <a:cs typeface="Times New Roman" panose="02020603050405020304" pitchFamily="18" charset="0"/>
+              </a:rPr>
+              <a:t>’  </a:t>
             </a:r>
             <a:r>
               <a:rPr lang="en-US" dirty="0" smtClean="0">
                 <a:latin typeface="Times New Roman" panose="02020603050405020304" pitchFamily="18" charset="0"/>
                 <a:cs typeface="Times New Roman" panose="02020603050405020304" pitchFamily="18" charset="0"/>
               </a:rPr>
-              <a:t>;</a:t>
-            </a:r>
-            <a:endParaRPr lang="ru-RU" dirty="0">
-              <a:latin typeface="Times New Roman" panose="02020603050405020304" pitchFamily="18" charset="0"/>
-              <a:cs typeface="Times New Roman" panose="02020603050405020304" pitchFamily="18" charset="0"/>
-            </a:endParaRPr>
+              <a:t>fields;</a:t>
+            </a:r>
+          </a:p>
+          <a:p>
+            <a:r>
+              <a:rPr lang="en-US" dirty="0" smtClean="0">
+                <a:latin typeface="Times New Roman" panose="02020603050405020304" pitchFamily="18" charset="0"/>
+                <a:cs typeface="Times New Roman" panose="02020603050405020304" pitchFamily="18" charset="0"/>
+              </a:rPr>
+              <a:t>R-type  commands use ‘</a:t>
+            </a:r>
+            <a:r>
+              <a:rPr lang="en-US" dirty="0"/>
+              <a:t>mem </a:t>
+            </a:r>
+            <a:r>
+              <a:rPr lang="en-US" dirty="0" smtClean="0"/>
+              <a:t>offset</a:t>
+            </a:r>
+            <a:r>
+              <a:rPr lang="en-US" dirty="0" smtClean="0">
+                <a:latin typeface="Times New Roman" panose="02020603050405020304" pitchFamily="18" charset="0"/>
+                <a:cs typeface="Times New Roman" panose="02020603050405020304" pitchFamily="18" charset="0"/>
+              </a:rPr>
+              <a:t>’ field;</a:t>
+            </a:r>
           </a:p>
         </p:txBody>
       </p:sp>
@@ -5218,8 +5270,8 @@
         </p:nvCxnSpPr>
         <p:spPr>
           <a:xfrm>
-            <a:off x="2215662" y="3080987"/>
-            <a:ext cx="3908" cy="1093613"/>
+            <a:off x="2197488" y="3080987"/>
+            <a:ext cx="27353" cy="1481647"/>
           </a:xfrm>
           <a:prstGeom prst="straightConnector1">
             <a:avLst/>
@@ -5251,7 +5303,7 @@
         </p:nvSpPr>
         <p:spPr>
           <a:xfrm>
-            <a:off x="521851" y="4365476"/>
+            <a:off x="535707" y="4562634"/>
             <a:ext cx="6082148" cy="646331"/>
           </a:xfrm>
           <a:prstGeom prst="rect">
@@ -5879,7 +5931,7 @@
         <p:spPr>
           <a:xfrm>
             <a:off x="791117" y="5247810"/>
-            <a:ext cx="10509929" cy="1477328"/>
+            <a:ext cx="11174237" cy="1477328"/>
           </a:xfrm>
           <a:prstGeom prst="rect">
             <a:avLst/>
@@ -5897,14 +5949,42 @@
                 <a:latin typeface="Courier New" panose="02070309020205020404" pitchFamily="49" charset="0"/>
                 <a:cs typeface="Courier New" panose="02070309020205020404" pitchFamily="49" charset="0"/>
               </a:rPr>
-              <a:t>r, 0, m, sw,  R0, R3, R2, 255 </a:t>
+              <a:t>r, </a:t>
             </a:r>
             <a:r>
               <a:rPr lang="pt-BR" dirty="0" smtClean="0">
                 <a:latin typeface="Courier New" panose="02070309020205020404" pitchFamily="49" charset="0"/>
                 <a:cs typeface="Courier New" panose="02070309020205020404" pitchFamily="49" charset="0"/>
               </a:rPr>
-              <a:t>// mem(r2+255) := r3 </a:t>
+              <a:t>m</a:t>
+            </a:r>
+            <a:r>
+              <a:rPr lang="pt-BR" dirty="0">
+                <a:latin typeface="Courier New" panose="02070309020205020404" pitchFamily="49" charset="0"/>
+                <a:cs typeface="Courier New" panose="02070309020205020404" pitchFamily="49" charset="0"/>
+              </a:rPr>
+              <a:t>, sw,  </a:t>
+            </a:r>
+            <a:r>
+              <a:rPr lang="pt-BR" dirty="0" smtClean="0">
+                <a:latin typeface="Courier New" panose="02070309020205020404" pitchFamily="49" charset="0"/>
+                <a:cs typeface="Courier New" panose="02070309020205020404" pitchFamily="49" charset="0"/>
+              </a:rPr>
+              <a:t>RX, </a:t>
+            </a:r>
+            <a:r>
+              <a:rPr lang="pt-BR" dirty="0">
+                <a:latin typeface="Courier New" panose="02070309020205020404" pitchFamily="49" charset="0"/>
+                <a:cs typeface="Courier New" panose="02070309020205020404" pitchFamily="49" charset="0"/>
+              </a:rPr>
+              <a:t>R3, R2, 255 </a:t>
+            </a:r>
+            <a:r>
+              <a:rPr lang="pt-BR" dirty="0" smtClean="0">
+                <a:latin typeface="Courier New" panose="02070309020205020404" pitchFamily="49" charset="0"/>
+                <a:cs typeface="Courier New" panose="02070309020205020404" pitchFamily="49" charset="0"/>
+              </a:rPr>
+              <a:t>// mem(r2+255) := r3 // RX is not used! set to R0;</a:t>
             </a:r>
             <a:endParaRPr lang="pt-BR" dirty="0">
               <a:latin typeface="Courier New" panose="02070309020205020404" pitchFamily="49" charset="0"/>
@@ -5917,53 +5997,120 @@
                 <a:latin typeface="Courier New" panose="02070309020205020404" pitchFamily="49" charset="0"/>
                 <a:cs typeface="Courier New" panose="02070309020205020404" pitchFamily="49" charset="0"/>
               </a:rPr>
-              <a:t>r, 1, m, lw,  </a:t>
+              <a:t>r, </a:t>
             </a:r>
             <a:r>
               <a:rPr lang="pt-BR" dirty="0" smtClean="0">
                 <a:latin typeface="Courier New" panose="02070309020205020404" pitchFamily="49" charset="0"/>
                 <a:cs typeface="Courier New" panose="02070309020205020404" pitchFamily="49" charset="0"/>
               </a:rPr>
-              <a:t>R0</a:t>
+              <a:t>m</a:t>
             </a:r>
             <a:r>
               <a:rPr lang="pt-BR" dirty="0">
                 <a:latin typeface="Courier New" panose="02070309020205020404" pitchFamily="49" charset="0"/>
                 <a:cs typeface="Courier New" panose="02070309020205020404" pitchFamily="49" charset="0"/>
               </a:rPr>
-              <a:t>, R0, R2, 255 </a:t>
+              <a:t>, lw,  </a:t>
             </a:r>
             <a:r>
               <a:rPr lang="pt-BR" dirty="0" smtClean="0">
                 <a:latin typeface="Courier New" panose="02070309020205020404" pitchFamily="49" charset="0"/>
                 <a:cs typeface="Courier New" panose="02070309020205020404" pitchFamily="49" charset="0"/>
               </a:rPr>
-              <a:t>// r0 := mem(r2+255)</a:t>
-            </a:r>
-          </a:p>
-          <a:p>
+              <a:t>R0</a:t>
+            </a:r>
             <a:r>
               <a:rPr lang="pt-BR" dirty="0">
                 <a:latin typeface="Courier New" panose="02070309020205020404" pitchFamily="49" charset="0"/>
                 <a:cs typeface="Courier New" panose="02070309020205020404" pitchFamily="49" charset="0"/>
               </a:rPr>
-              <a:t> </a:t>
+              <a:t>, </a:t>
             </a:r>
             <a:r>
               <a:rPr lang="pt-BR" dirty="0" smtClean="0">
                 <a:latin typeface="Courier New" panose="02070309020205020404" pitchFamily="49" charset="0"/>
                 <a:cs typeface="Courier New" panose="02070309020205020404" pitchFamily="49" charset="0"/>
               </a:rPr>
-              <a:t>                             //</a:t>
-            </a:r>
-          </a:p>
-          <a:p>
+              <a:t>RX, </a:t>
+            </a:r>
             <a:r>
               <a:rPr lang="pt-BR" dirty="0">
                 <a:latin typeface="Courier New" panose="02070309020205020404" pitchFamily="49" charset="0"/>
                 <a:cs typeface="Courier New" panose="02070309020205020404" pitchFamily="49" charset="0"/>
               </a:rPr>
-              <a:t>i, 0, m, sw,  R0, R3, R2, 255 </a:t>
+              <a:t>R2, 255 </a:t>
+            </a:r>
+            <a:r>
+              <a:rPr lang="pt-BR" dirty="0" smtClean="0">
+                <a:latin typeface="Courier New" panose="02070309020205020404" pitchFamily="49" charset="0"/>
+                <a:cs typeface="Courier New" panose="02070309020205020404" pitchFamily="49" charset="0"/>
+              </a:rPr>
+              <a:t>// r0 := mem(r2+255</a:t>
+            </a:r>
+            <a:r>
+              <a:rPr lang="pt-BR" dirty="0">
+                <a:latin typeface="Courier New" panose="02070309020205020404" pitchFamily="49" charset="0"/>
+                <a:cs typeface="Courier New" panose="02070309020205020404" pitchFamily="49" charset="0"/>
+              </a:rPr>
+              <a:t>) // RX is not used</a:t>
+            </a:r>
+            <a:r>
+              <a:rPr lang="pt-BR" dirty="0" smtClean="0">
+                <a:latin typeface="Courier New" panose="02070309020205020404" pitchFamily="49" charset="0"/>
+                <a:cs typeface="Courier New" panose="02070309020205020404" pitchFamily="49" charset="0"/>
+              </a:rPr>
+              <a:t>! </a:t>
+            </a:r>
+            <a:r>
+              <a:rPr lang="pt-BR" dirty="0">
+                <a:latin typeface="Courier New" panose="02070309020205020404" pitchFamily="49" charset="0"/>
+                <a:cs typeface="Courier New" panose="02070309020205020404" pitchFamily="49" charset="0"/>
+              </a:rPr>
+              <a:t>set to R0;</a:t>
+            </a:r>
+            <a:endParaRPr lang="pt-BR" dirty="0" smtClean="0">
+              <a:latin typeface="Courier New" panose="02070309020205020404" pitchFamily="49" charset="0"/>
+              <a:cs typeface="Courier New" panose="02070309020205020404" pitchFamily="49" charset="0"/>
+            </a:endParaRPr>
+          </a:p>
+          <a:p>
+            <a:r>
+              <a:rPr lang="pt-BR" dirty="0">
+                <a:latin typeface="Courier New" panose="02070309020205020404" pitchFamily="49" charset="0"/>
+                <a:cs typeface="Courier New" panose="02070309020205020404" pitchFamily="49" charset="0"/>
+              </a:rPr>
+              <a:t> </a:t>
+            </a:r>
+            <a:r>
+              <a:rPr lang="pt-BR" dirty="0" smtClean="0">
+                <a:latin typeface="Courier New" panose="02070309020205020404" pitchFamily="49" charset="0"/>
+                <a:cs typeface="Courier New" panose="02070309020205020404" pitchFamily="49" charset="0"/>
+              </a:rPr>
+              <a:t>                          //</a:t>
+            </a:r>
+          </a:p>
+          <a:p>
+            <a:r>
+              <a:rPr lang="pt-BR" dirty="0">
+                <a:latin typeface="Courier New" panose="02070309020205020404" pitchFamily="49" charset="0"/>
+                <a:cs typeface="Courier New" panose="02070309020205020404" pitchFamily="49" charset="0"/>
+              </a:rPr>
+              <a:t>i, </a:t>
+            </a:r>
+            <a:r>
+              <a:rPr lang="pt-BR" dirty="0" smtClean="0">
+                <a:latin typeface="Courier New" panose="02070309020205020404" pitchFamily="49" charset="0"/>
+                <a:cs typeface="Courier New" panose="02070309020205020404" pitchFamily="49" charset="0"/>
+              </a:rPr>
+              <a:t>m</a:t>
+            </a:r>
+            <a:r>
+              <a:rPr lang="pt-BR" dirty="0">
+                <a:latin typeface="Courier New" panose="02070309020205020404" pitchFamily="49" charset="0"/>
+                <a:cs typeface="Courier New" panose="02070309020205020404" pitchFamily="49" charset="0"/>
+              </a:rPr>
+              <a:t>, sw,  R0, R3, R2, 255 </a:t>
             </a:r>
             <a:r>
               <a:rPr lang="pt-BR" dirty="0" smtClean="0">

</xml_diff>

<commit_message>
in progress with scoreboard
</commit_message>
<xml_diff>
--- a/DOC/isa_encoding.pptx
+++ b/DOC/isa_encoding.pptx
@@ -245,7 +245,7 @@
           <a:p>
             <a:fld id="{EE595349-DA93-472D-828A-76CE9E4C1479}" type="datetimeFigureOut">
               <a:rPr lang="ru-RU" smtClean="0"/>
-              <a:t>04.02.2018</a:t>
+              <a:t>08.02.2018</a:t>
             </a:fld>
             <a:endParaRPr lang="ru-RU"/>
           </a:p>
@@ -415,7 +415,7 @@
           <a:p>
             <a:fld id="{EE595349-DA93-472D-828A-76CE9E4C1479}" type="datetimeFigureOut">
               <a:rPr lang="ru-RU" smtClean="0"/>
-              <a:t>04.02.2018</a:t>
+              <a:t>08.02.2018</a:t>
             </a:fld>
             <a:endParaRPr lang="ru-RU"/>
           </a:p>
@@ -595,7 +595,7 @@
           <a:p>
             <a:fld id="{EE595349-DA93-472D-828A-76CE9E4C1479}" type="datetimeFigureOut">
               <a:rPr lang="ru-RU" smtClean="0"/>
-              <a:t>04.02.2018</a:t>
+              <a:t>08.02.2018</a:t>
             </a:fld>
             <a:endParaRPr lang="ru-RU"/>
           </a:p>
@@ -765,7 +765,7 @@
           <a:p>
             <a:fld id="{EE595349-DA93-472D-828A-76CE9E4C1479}" type="datetimeFigureOut">
               <a:rPr lang="ru-RU" smtClean="0"/>
-              <a:t>04.02.2018</a:t>
+              <a:t>08.02.2018</a:t>
             </a:fld>
             <a:endParaRPr lang="ru-RU"/>
           </a:p>
@@ -1011,7 +1011,7 @@
           <a:p>
             <a:fld id="{EE595349-DA93-472D-828A-76CE9E4C1479}" type="datetimeFigureOut">
               <a:rPr lang="ru-RU" smtClean="0"/>
-              <a:t>04.02.2018</a:t>
+              <a:t>08.02.2018</a:t>
             </a:fld>
             <a:endParaRPr lang="ru-RU"/>
           </a:p>
@@ -1243,7 +1243,7 @@
           <a:p>
             <a:fld id="{EE595349-DA93-472D-828A-76CE9E4C1479}" type="datetimeFigureOut">
               <a:rPr lang="ru-RU" smtClean="0"/>
-              <a:t>04.02.2018</a:t>
+              <a:t>08.02.2018</a:t>
             </a:fld>
             <a:endParaRPr lang="ru-RU"/>
           </a:p>
@@ -1610,7 +1610,7 @@
           <a:p>
             <a:fld id="{EE595349-DA93-472D-828A-76CE9E4C1479}" type="datetimeFigureOut">
               <a:rPr lang="ru-RU" smtClean="0"/>
-              <a:t>04.02.2018</a:t>
+              <a:t>08.02.2018</a:t>
             </a:fld>
             <a:endParaRPr lang="ru-RU"/>
           </a:p>
@@ -1728,7 +1728,7 @@
           <a:p>
             <a:fld id="{EE595349-DA93-472D-828A-76CE9E4C1479}" type="datetimeFigureOut">
               <a:rPr lang="ru-RU" smtClean="0"/>
-              <a:t>04.02.2018</a:t>
+              <a:t>08.02.2018</a:t>
             </a:fld>
             <a:endParaRPr lang="ru-RU"/>
           </a:p>
@@ -1823,7 +1823,7 @@
           <a:p>
             <a:fld id="{EE595349-DA93-472D-828A-76CE9E4C1479}" type="datetimeFigureOut">
               <a:rPr lang="ru-RU" smtClean="0"/>
-              <a:t>04.02.2018</a:t>
+              <a:t>08.02.2018</a:t>
             </a:fld>
             <a:endParaRPr lang="ru-RU"/>
           </a:p>
@@ -2100,7 +2100,7 @@
           <a:p>
             <a:fld id="{EE595349-DA93-472D-828A-76CE9E4C1479}" type="datetimeFigureOut">
               <a:rPr lang="ru-RU" smtClean="0"/>
-              <a:t>04.02.2018</a:t>
+              <a:t>08.02.2018</a:t>
             </a:fld>
             <a:endParaRPr lang="ru-RU"/>
           </a:p>
@@ -2353,7 +2353,7 @@
           <a:p>
             <a:fld id="{EE595349-DA93-472D-828A-76CE9E4C1479}" type="datetimeFigureOut">
               <a:rPr lang="ru-RU" smtClean="0"/>
-              <a:t>04.02.2018</a:t>
+              <a:t>08.02.2018</a:t>
             </a:fld>
             <a:endParaRPr lang="ru-RU"/>
           </a:p>
@@ -2566,7 +2566,7 @@
           <a:p>
             <a:fld id="{EE595349-DA93-472D-828A-76CE9E4C1479}" type="datetimeFigureOut">
               <a:rPr lang="ru-RU" smtClean="0"/>
-              <a:t>04.02.2018</a:t>
+              <a:t>08.02.2018</a:t>
             </a:fld>
             <a:endParaRPr lang="ru-RU"/>
           </a:p>
@@ -3069,7 +3069,11 @@
           <a:p>
             <a:r>
               <a:rPr lang="en-US" dirty="0" smtClean="0"/>
-              <a:t>ALU Instructions </a:t>
+              <a:t>ALU (integer) </a:t>
+            </a:r>
+            <a:r>
+              <a:rPr lang="en-US" dirty="0" smtClean="0"/>
+              <a:t>Instructions </a:t>
             </a:r>
             <a:endParaRPr lang="ru-RU" dirty="0"/>
           </a:p>
@@ -4237,12 +4241,12 @@
               <a:t>R0                 R1                 R2                                not used                </a:t>
             </a:r>
             <a:r>
-              <a:rPr lang="en-US" dirty="0" err="1" smtClean="0"/>
-              <a:t>cond</a:t>
-            </a:r>
-            <a:r>
               <a:rPr lang="en-US" dirty="0" smtClean="0"/>
-              <a:t> flags</a:t>
+              <a:t>cond. </a:t>
+            </a:r>
+            <a:r>
+              <a:rPr lang="en-US" dirty="0" smtClean="0"/>
+              <a:t>flags</a:t>
             </a:r>
             <a:endParaRPr lang="ru-RU" dirty="0"/>
           </a:p>
@@ -5866,23 +5870,7 @@
           <a:p>
             <a:r>
               <a:rPr lang="en-US" dirty="0" smtClean="0"/>
-              <a:t>R0                 R1                 R2                    </a:t>
-            </a:r>
-            <a:r>
-              <a:rPr lang="en-US" dirty="0" smtClean="0"/>
-              <a:t>mem offset </a:t>
-            </a:r>
-            <a:r>
-              <a:rPr lang="en-US" dirty="0" smtClean="0"/>
-              <a:t>[0-255]         </a:t>
-            </a:r>
-            <a:r>
-              <a:rPr lang="en-US" dirty="0" smtClean="0"/>
-              <a:t>cond. </a:t>
-            </a:r>
-            <a:r>
-              <a:rPr lang="en-US" dirty="0" smtClean="0"/>
-              <a:t>flags</a:t>
+              <a:t>R0                 R1                 R2                    mem offset [0-255]         cond. flags</a:t>
             </a:r>
             <a:endParaRPr lang="ru-RU" dirty="0"/>
           </a:p>

</xml_diff>